<commit_message>
Site updated: 2026-01-06 16:08:06
</commit_message>
<xml_diff>
--- a/03.应用-03.windows/桌面配置/桌面背景.pptx
+++ b/03.应用-03.windows/桌面配置/桌面背景.pptx
@@ -2,18 +2,18 @@
 <file path=ppt/presentation.xml><?xml version="1.0" encoding="utf-8"?>
 <p:presentation xmlns:a="http://schemas.openxmlformats.org/drawingml/2006/main" xmlns:r="http://schemas.openxmlformats.org/officeDocument/2006/relationships" xmlns:p="http://schemas.openxmlformats.org/presentationml/2006/main" saveSubsetFonts="1">
   <p:sldMasterIdLst>
-    <p:sldMasterId id="2147483660" r:id="rId1"/>
+    <p:sldMasterId id="2147483684" r:id="rId1"/>
   </p:sldMasterIdLst>
   <p:sldIdLst>
     <p:sldId id="258" r:id="rId2"/>
   </p:sldIdLst>
-  <p:sldSz cx="12192000" cy="6858000"/>
+  <p:sldSz cx="48768000" cy="27432000"/>
   <p:notesSz cx="6858000" cy="9144000"/>
   <p:defaultTextStyle>
     <a:defPPr>
-      <a:defRPr lang="zh-CN"/>
+      <a:defRPr lang="en-US"/>
     </a:defPPr>
-    <a:lvl1pPr marL="0" algn="l" defTabSz="914400" rtl="0" eaLnBrk="1" latinLnBrk="0" hangingPunct="1">
+    <a:lvl1pPr marL="0" algn="l" defTabSz="457200" rtl="0" eaLnBrk="1" latinLnBrk="0" hangingPunct="1">
       <a:defRPr sz="1800" kern="1200">
         <a:solidFill>
           <a:schemeClr val="tx1"/>
@@ -23,7 +23,7 @@
         <a:cs typeface="+mn-cs"/>
       </a:defRPr>
     </a:lvl1pPr>
-    <a:lvl2pPr marL="457200" algn="l" defTabSz="914400" rtl="0" eaLnBrk="1" latinLnBrk="0" hangingPunct="1">
+    <a:lvl2pPr marL="457200" algn="l" defTabSz="457200" rtl="0" eaLnBrk="1" latinLnBrk="0" hangingPunct="1">
       <a:defRPr sz="1800" kern="1200">
         <a:solidFill>
           <a:schemeClr val="tx1"/>
@@ -33,7 +33,7 @@
         <a:cs typeface="+mn-cs"/>
       </a:defRPr>
     </a:lvl2pPr>
-    <a:lvl3pPr marL="914400" algn="l" defTabSz="914400" rtl="0" eaLnBrk="1" latinLnBrk="0" hangingPunct="1">
+    <a:lvl3pPr marL="914400" algn="l" defTabSz="457200" rtl="0" eaLnBrk="1" latinLnBrk="0" hangingPunct="1">
       <a:defRPr sz="1800" kern="1200">
         <a:solidFill>
           <a:schemeClr val="tx1"/>
@@ -43,7 +43,7 @@
         <a:cs typeface="+mn-cs"/>
       </a:defRPr>
     </a:lvl3pPr>
-    <a:lvl4pPr marL="1371600" algn="l" defTabSz="914400" rtl="0" eaLnBrk="1" latinLnBrk="0" hangingPunct="1">
+    <a:lvl4pPr marL="1371600" algn="l" defTabSz="457200" rtl="0" eaLnBrk="1" latinLnBrk="0" hangingPunct="1">
       <a:defRPr sz="1800" kern="1200">
         <a:solidFill>
           <a:schemeClr val="tx1"/>
@@ -53,7 +53,7 @@
         <a:cs typeface="+mn-cs"/>
       </a:defRPr>
     </a:lvl4pPr>
-    <a:lvl5pPr marL="1828800" algn="l" defTabSz="914400" rtl="0" eaLnBrk="1" latinLnBrk="0" hangingPunct="1">
+    <a:lvl5pPr marL="1828800" algn="l" defTabSz="457200" rtl="0" eaLnBrk="1" latinLnBrk="0" hangingPunct="1">
       <a:defRPr sz="1800" kern="1200">
         <a:solidFill>
           <a:schemeClr val="tx1"/>
@@ -63,7 +63,7 @@
         <a:cs typeface="+mn-cs"/>
       </a:defRPr>
     </a:lvl5pPr>
-    <a:lvl6pPr marL="2286000" algn="l" defTabSz="914400" rtl="0" eaLnBrk="1" latinLnBrk="0" hangingPunct="1">
+    <a:lvl6pPr marL="2286000" algn="l" defTabSz="457200" rtl="0" eaLnBrk="1" latinLnBrk="0" hangingPunct="1">
       <a:defRPr sz="1800" kern="1200">
         <a:solidFill>
           <a:schemeClr val="tx1"/>
@@ -73,7 +73,7 @@
         <a:cs typeface="+mn-cs"/>
       </a:defRPr>
     </a:lvl6pPr>
-    <a:lvl7pPr marL="2743200" algn="l" defTabSz="914400" rtl="0" eaLnBrk="1" latinLnBrk="0" hangingPunct="1">
+    <a:lvl7pPr marL="2743200" algn="l" defTabSz="457200" rtl="0" eaLnBrk="1" latinLnBrk="0" hangingPunct="1">
       <a:defRPr sz="1800" kern="1200">
         <a:solidFill>
           <a:schemeClr val="tx1"/>
@@ -83,7 +83,7 @@
         <a:cs typeface="+mn-cs"/>
       </a:defRPr>
     </a:lvl7pPr>
-    <a:lvl8pPr marL="3200400" algn="l" defTabSz="914400" rtl="0" eaLnBrk="1" latinLnBrk="0" hangingPunct="1">
+    <a:lvl8pPr marL="3200400" algn="l" defTabSz="457200" rtl="0" eaLnBrk="1" latinLnBrk="0" hangingPunct="1">
       <a:defRPr sz="1800" kern="1200">
         <a:solidFill>
           <a:schemeClr val="tx1"/>
@@ -93,7 +93,7 @@
         <a:cs typeface="+mn-cs"/>
       </a:defRPr>
     </a:lvl8pPr>
-    <a:lvl9pPr marL="3657600" algn="l" defTabSz="914400" rtl="0" eaLnBrk="1" latinLnBrk="0" hangingPunct="1">
+    <a:lvl9pPr marL="3657600" algn="l" defTabSz="457200" rtl="0" eaLnBrk="1" latinLnBrk="0" hangingPunct="1">
       <a:defRPr sz="1800" kern="1200">
         <a:solidFill>
           <a:schemeClr val="tx1"/>
@@ -107,12 +107,12 @@
   <p:extLst>
     <p:ext uri="{EFAFB233-063F-42B5-8137-9DF3F51BA10A}">
       <p15:sldGuideLst xmlns:p15="http://schemas.microsoft.com/office/powerpoint/2012/main">
-        <p15:guide id="1" orient="horz" pos="2160" userDrawn="1">
+        <p15:guide id="1" orient="horz" pos="8640" userDrawn="1">
           <p15:clr>
             <a:srgbClr val="A4A3A4"/>
           </p15:clr>
         </p15:guide>
-        <p15:guide id="2" pos="3840" userDrawn="1">
+        <p15:guide id="2" pos="15360" userDrawn="1">
           <p15:clr>
             <a:srgbClr val="A4A3A4"/>
           </p15:clr>
@@ -152,15 +152,15 @@
         </p:nvSpPr>
         <p:spPr>
           <a:xfrm>
-            <a:off x="1524000" y="1122363"/>
-            <a:ext cx="9144000" cy="2387600"/>
+            <a:off x="6096000" y="4489452"/>
+            <a:ext cx="36576000" cy="9550400"/>
           </a:xfrm>
         </p:spPr>
         <p:txBody>
           <a:bodyPr anchor="b"/>
           <a:lstStyle>
             <a:lvl1pPr algn="ctr">
-              <a:defRPr sz="6000"/>
+              <a:defRPr sz="24000"/>
             </a:lvl1pPr>
           </a:lstStyle>
           <a:p>
@@ -184,8 +184,8 @@
         </p:nvSpPr>
         <p:spPr>
           <a:xfrm>
-            <a:off x="1524000" y="3602038"/>
-            <a:ext cx="9144000" cy="1655762"/>
+            <a:off x="6096000" y="14408152"/>
+            <a:ext cx="36576000" cy="6623048"/>
           </a:xfrm>
         </p:spPr>
         <p:txBody>
@@ -193,39 +193,39 @@
           <a:lstStyle>
             <a:lvl1pPr marL="0" indent="0" algn="ctr">
               <a:buNone/>
-              <a:defRPr sz="2400"/>
+              <a:defRPr sz="9600"/>
             </a:lvl1pPr>
-            <a:lvl2pPr marL="457225" indent="0" algn="ctr">
-              <a:buNone/>
-              <a:defRPr sz="2000"/>
+            <a:lvl2pPr marL="1828800" indent="0" algn="ctr">
+              <a:buNone/>
+              <a:defRPr sz="8000"/>
             </a:lvl2pPr>
-            <a:lvl3pPr marL="914451" indent="0" algn="ctr">
-              <a:buNone/>
-              <a:defRPr sz="1800"/>
+            <a:lvl3pPr marL="3657600" indent="0" algn="ctr">
+              <a:buNone/>
+              <a:defRPr sz="7200"/>
             </a:lvl3pPr>
-            <a:lvl4pPr marL="1371676" indent="0" algn="ctr">
-              <a:buNone/>
-              <a:defRPr sz="1600"/>
+            <a:lvl4pPr marL="5486400" indent="0" algn="ctr">
+              <a:buNone/>
+              <a:defRPr sz="6400"/>
             </a:lvl4pPr>
-            <a:lvl5pPr marL="1828902" indent="0" algn="ctr">
-              <a:buNone/>
-              <a:defRPr sz="1600"/>
+            <a:lvl5pPr marL="7315200" indent="0" algn="ctr">
+              <a:buNone/>
+              <a:defRPr sz="6400"/>
             </a:lvl5pPr>
-            <a:lvl6pPr marL="2286127" indent="0" algn="ctr">
-              <a:buNone/>
-              <a:defRPr sz="1600"/>
+            <a:lvl6pPr marL="9144000" indent="0" algn="ctr">
+              <a:buNone/>
+              <a:defRPr sz="6400"/>
             </a:lvl6pPr>
-            <a:lvl7pPr marL="2743353" indent="0" algn="ctr">
-              <a:buNone/>
-              <a:defRPr sz="1600"/>
+            <a:lvl7pPr marL="10972800" indent="0" algn="ctr">
+              <a:buNone/>
+              <a:defRPr sz="6400"/>
             </a:lvl7pPr>
-            <a:lvl8pPr marL="3200578" indent="0" algn="ctr">
-              <a:buNone/>
-              <a:defRPr sz="1600"/>
+            <a:lvl8pPr marL="12801600" indent="0" algn="ctr">
+              <a:buNone/>
+              <a:defRPr sz="6400"/>
             </a:lvl8pPr>
-            <a:lvl9pPr marL="3657804" indent="0" algn="ctr">
-              <a:buNone/>
-              <a:defRPr sz="1600"/>
+            <a:lvl9pPr marL="14630400" indent="0" algn="ctr">
+              <a:buNone/>
+              <a:defRPr sz="6400"/>
             </a:lvl9pPr>
           </a:lstStyle>
           <a:p>
@@ -254,7 +254,7 @@
           <a:p>
             <a:fld id="{897FBA0E-E6C1-48AC-A269-B6BACD4E8CFD}" type="datetimeFigureOut">
               <a:rPr lang="zh-CN" altLang="en-US" smtClean="0"/>
-              <a:t>2024/11/20</a:t>
+              <a:t>2025/2/7</a:t>
             </a:fld>
             <a:endParaRPr lang="zh-CN" altLang="en-US"/>
           </a:p>
@@ -305,7 +305,7 @@
     </p:spTree>
     <p:extLst>
       <p:ext uri="{BB962C8B-B14F-4D97-AF65-F5344CB8AC3E}">
-        <p14:creationId xmlns:p14="http://schemas.microsoft.com/office/powerpoint/2010/main" val="1132595072"/>
+        <p14:creationId xmlns:p14="http://schemas.microsoft.com/office/powerpoint/2010/main" val="236188641"/>
       </p:ext>
     </p:extLst>
   </p:cSld>
@@ -424,7 +424,7 @@
           <a:p>
             <a:fld id="{897FBA0E-E6C1-48AC-A269-B6BACD4E8CFD}" type="datetimeFigureOut">
               <a:rPr lang="zh-CN" altLang="en-US" smtClean="0"/>
-              <a:t>2024/11/20</a:t>
+              <a:t>2025/2/7</a:t>
             </a:fld>
             <a:endParaRPr lang="zh-CN" altLang="en-US"/>
           </a:p>
@@ -475,7 +475,7 @@
     </p:spTree>
     <p:extLst>
       <p:ext uri="{BB962C8B-B14F-4D97-AF65-F5344CB8AC3E}">
-        <p14:creationId xmlns:p14="http://schemas.microsoft.com/office/powerpoint/2010/main" val="4094386567"/>
+        <p14:creationId xmlns:p14="http://schemas.microsoft.com/office/powerpoint/2010/main" val="462291060"/>
       </p:ext>
     </p:extLst>
   </p:cSld>
@@ -514,8 +514,8 @@
         </p:nvSpPr>
         <p:spPr>
           <a:xfrm>
-            <a:off x="8724900" y="365125"/>
-            <a:ext cx="2628900" cy="5811838"/>
+            <a:off x="34899600" y="1460500"/>
+            <a:ext cx="10515600" cy="23247352"/>
           </a:xfrm>
         </p:spPr>
         <p:txBody>
@@ -542,8 +542,8 @@
         </p:nvSpPr>
         <p:spPr>
           <a:xfrm>
-            <a:off x="838200" y="365125"/>
-            <a:ext cx="7734300" cy="5811838"/>
+            <a:off x="3352800" y="1460500"/>
+            <a:ext cx="30937200" cy="23247352"/>
           </a:xfrm>
         </p:spPr>
         <p:txBody>
@@ -604,7 +604,7 @@
           <a:p>
             <a:fld id="{897FBA0E-E6C1-48AC-A269-B6BACD4E8CFD}" type="datetimeFigureOut">
               <a:rPr lang="zh-CN" altLang="en-US" smtClean="0"/>
-              <a:t>2024/11/20</a:t>
+              <a:t>2025/2/7</a:t>
             </a:fld>
             <a:endParaRPr lang="zh-CN" altLang="en-US"/>
           </a:p>
@@ -655,7 +655,7 @@
     </p:spTree>
     <p:extLst>
       <p:ext uri="{BB962C8B-B14F-4D97-AF65-F5344CB8AC3E}">
-        <p14:creationId xmlns:p14="http://schemas.microsoft.com/office/powerpoint/2010/main" val="2291262434"/>
+        <p14:creationId xmlns:p14="http://schemas.microsoft.com/office/powerpoint/2010/main" val="1410490455"/>
       </p:ext>
     </p:extLst>
   </p:cSld>
@@ -774,7 +774,7 @@
           <a:p>
             <a:fld id="{897FBA0E-E6C1-48AC-A269-B6BACD4E8CFD}" type="datetimeFigureOut">
               <a:rPr lang="zh-CN" altLang="en-US" smtClean="0"/>
-              <a:t>2024/11/20</a:t>
+              <a:t>2025/2/7</a:t>
             </a:fld>
             <a:endParaRPr lang="zh-CN" altLang="en-US"/>
           </a:p>
@@ -825,7 +825,7 @@
     </p:spTree>
     <p:extLst>
       <p:ext uri="{BB962C8B-B14F-4D97-AF65-F5344CB8AC3E}">
-        <p14:creationId xmlns:p14="http://schemas.microsoft.com/office/powerpoint/2010/main" val="4269538354"/>
+        <p14:creationId xmlns:p14="http://schemas.microsoft.com/office/powerpoint/2010/main" val="3654288051"/>
       </p:ext>
     </p:extLst>
   </p:cSld>
@@ -864,15 +864,15 @@
         </p:nvSpPr>
         <p:spPr>
           <a:xfrm>
-            <a:off x="831850" y="1709738"/>
-            <a:ext cx="10515600" cy="2852737"/>
+            <a:off x="3327400" y="6838954"/>
+            <a:ext cx="42062400" cy="11410948"/>
           </a:xfrm>
         </p:spPr>
         <p:txBody>
           <a:bodyPr anchor="b"/>
           <a:lstStyle>
             <a:lvl1pPr>
-              <a:defRPr sz="6000"/>
+              <a:defRPr sz="24000"/>
             </a:lvl1pPr>
           </a:lstStyle>
           <a:p>
@@ -896,8 +896,8 @@
         </p:nvSpPr>
         <p:spPr>
           <a:xfrm>
-            <a:off x="831850" y="4589463"/>
-            <a:ext cx="10515600" cy="1500187"/>
+            <a:off x="3327400" y="18357854"/>
+            <a:ext cx="42062400" cy="6000748"/>
           </a:xfrm>
         </p:spPr>
         <p:txBody>
@@ -905,7 +905,7 @@
           <a:lstStyle>
             <a:lvl1pPr marL="0" indent="0">
               <a:buNone/>
-              <a:defRPr sz="2400">
+              <a:defRPr sz="9600">
                 <a:solidFill>
                   <a:schemeClr val="tx1">
                     <a:tint val="75000"/>
@@ -913,9 +913,9 @@
                 </a:solidFill>
               </a:defRPr>
             </a:lvl1pPr>
-            <a:lvl2pPr marL="457225" indent="0">
-              <a:buNone/>
-              <a:defRPr sz="2000">
+            <a:lvl2pPr marL="1828800" indent="0">
+              <a:buNone/>
+              <a:defRPr sz="8000">
                 <a:solidFill>
                   <a:schemeClr val="tx1">
                     <a:tint val="75000"/>
@@ -923,9 +923,9 @@
                 </a:solidFill>
               </a:defRPr>
             </a:lvl2pPr>
-            <a:lvl3pPr marL="914451" indent="0">
-              <a:buNone/>
-              <a:defRPr sz="1800">
+            <a:lvl3pPr marL="3657600" indent="0">
+              <a:buNone/>
+              <a:defRPr sz="7200">
                 <a:solidFill>
                   <a:schemeClr val="tx1">
                     <a:tint val="75000"/>
@@ -933,9 +933,9 @@
                 </a:solidFill>
               </a:defRPr>
             </a:lvl3pPr>
-            <a:lvl4pPr marL="1371676" indent="0">
-              <a:buNone/>
-              <a:defRPr sz="1600">
+            <a:lvl4pPr marL="5486400" indent="0">
+              <a:buNone/>
+              <a:defRPr sz="6400">
                 <a:solidFill>
                   <a:schemeClr val="tx1">
                     <a:tint val="75000"/>
@@ -943,9 +943,9 @@
                 </a:solidFill>
               </a:defRPr>
             </a:lvl4pPr>
-            <a:lvl5pPr marL="1828902" indent="0">
-              <a:buNone/>
-              <a:defRPr sz="1600">
+            <a:lvl5pPr marL="7315200" indent="0">
+              <a:buNone/>
+              <a:defRPr sz="6400">
                 <a:solidFill>
                   <a:schemeClr val="tx1">
                     <a:tint val="75000"/>
@@ -953,9 +953,9 @@
                 </a:solidFill>
               </a:defRPr>
             </a:lvl5pPr>
-            <a:lvl6pPr marL="2286127" indent="0">
-              <a:buNone/>
-              <a:defRPr sz="1600">
+            <a:lvl6pPr marL="9144000" indent="0">
+              <a:buNone/>
+              <a:defRPr sz="6400">
                 <a:solidFill>
                   <a:schemeClr val="tx1">
                     <a:tint val="75000"/>
@@ -963,9 +963,9 @@
                 </a:solidFill>
               </a:defRPr>
             </a:lvl6pPr>
-            <a:lvl7pPr marL="2743353" indent="0">
-              <a:buNone/>
-              <a:defRPr sz="1600">
+            <a:lvl7pPr marL="10972800" indent="0">
+              <a:buNone/>
+              <a:defRPr sz="6400">
                 <a:solidFill>
                   <a:schemeClr val="tx1">
                     <a:tint val="75000"/>
@@ -973,9 +973,9 @@
                 </a:solidFill>
               </a:defRPr>
             </a:lvl7pPr>
-            <a:lvl8pPr marL="3200578" indent="0">
-              <a:buNone/>
-              <a:defRPr sz="1600">
+            <a:lvl8pPr marL="12801600" indent="0">
+              <a:buNone/>
+              <a:defRPr sz="6400">
                 <a:solidFill>
                   <a:schemeClr val="tx1">
                     <a:tint val="75000"/>
@@ -983,9 +983,9 @@
                 </a:solidFill>
               </a:defRPr>
             </a:lvl8pPr>
-            <a:lvl9pPr marL="3657804" indent="0">
-              <a:buNone/>
-              <a:defRPr sz="1600">
+            <a:lvl9pPr marL="14630400" indent="0">
+              <a:buNone/>
+              <a:defRPr sz="6400">
                 <a:solidFill>
                   <a:schemeClr val="tx1">
                     <a:tint val="75000"/>
@@ -1020,7 +1020,7 @@
           <a:p>
             <a:fld id="{897FBA0E-E6C1-48AC-A269-B6BACD4E8CFD}" type="datetimeFigureOut">
               <a:rPr lang="zh-CN" altLang="en-US" smtClean="0"/>
-              <a:t>2024/11/20</a:t>
+              <a:t>2025/2/7</a:t>
             </a:fld>
             <a:endParaRPr lang="zh-CN" altLang="en-US"/>
           </a:p>
@@ -1071,7 +1071,7 @@
     </p:spTree>
     <p:extLst>
       <p:ext uri="{BB962C8B-B14F-4D97-AF65-F5344CB8AC3E}">
-        <p14:creationId xmlns:p14="http://schemas.microsoft.com/office/powerpoint/2010/main" val="1202858562"/>
+        <p14:creationId xmlns:p14="http://schemas.microsoft.com/office/powerpoint/2010/main" val="3774964076"/>
       </p:ext>
     </p:extLst>
   </p:cSld>
@@ -1133,8 +1133,8 @@
         </p:nvSpPr>
         <p:spPr>
           <a:xfrm>
-            <a:off x="838200" y="1825625"/>
-            <a:ext cx="5181600" cy="4351338"/>
+            <a:off x="3352800" y="7302500"/>
+            <a:ext cx="20726400" cy="17405352"/>
           </a:xfrm>
         </p:spPr>
         <p:txBody>
@@ -1190,8 +1190,8 @@
         </p:nvSpPr>
         <p:spPr>
           <a:xfrm>
-            <a:off x="6172200" y="1825625"/>
-            <a:ext cx="5181600" cy="4351338"/>
+            <a:off x="24688800" y="7302500"/>
+            <a:ext cx="20726400" cy="17405352"/>
           </a:xfrm>
         </p:spPr>
         <p:txBody>
@@ -1252,7 +1252,7 @@
           <a:p>
             <a:fld id="{897FBA0E-E6C1-48AC-A269-B6BACD4E8CFD}" type="datetimeFigureOut">
               <a:rPr lang="zh-CN" altLang="en-US" smtClean="0"/>
-              <a:t>2024/11/20</a:t>
+              <a:t>2025/2/7</a:t>
             </a:fld>
             <a:endParaRPr lang="zh-CN" altLang="en-US"/>
           </a:p>
@@ -1303,7 +1303,7 @@
     </p:spTree>
     <p:extLst>
       <p:ext uri="{BB962C8B-B14F-4D97-AF65-F5344CB8AC3E}">
-        <p14:creationId xmlns:p14="http://schemas.microsoft.com/office/powerpoint/2010/main" val="2195150049"/>
+        <p14:creationId xmlns:p14="http://schemas.microsoft.com/office/powerpoint/2010/main" val="301131960"/>
       </p:ext>
     </p:extLst>
   </p:cSld>
@@ -1342,8 +1342,8 @@
         </p:nvSpPr>
         <p:spPr>
           <a:xfrm>
-            <a:off x="839788" y="365125"/>
-            <a:ext cx="10515600" cy="1325563"/>
+            <a:off x="3359152" y="1460502"/>
+            <a:ext cx="42062400" cy="5302252"/>
           </a:xfrm>
         </p:spPr>
         <p:txBody>
@@ -1370,8 +1370,8 @@
         </p:nvSpPr>
         <p:spPr>
           <a:xfrm>
-            <a:off x="839789" y="1681163"/>
-            <a:ext cx="5157787" cy="823912"/>
+            <a:off x="3359154" y="6724652"/>
+            <a:ext cx="20631148" cy="3295648"/>
           </a:xfrm>
         </p:spPr>
         <p:txBody>
@@ -1379,39 +1379,39 @@
           <a:lstStyle>
             <a:lvl1pPr marL="0" indent="0">
               <a:buNone/>
-              <a:defRPr sz="2400" b="1"/>
+              <a:defRPr sz="9600" b="1"/>
             </a:lvl1pPr>
-            <a:lvl2pPr marL="457225" indent="0">
-              <a:buNone/>
-              <a:defRPr sz="2000" b="1"/>
+            <a:lvl2pPr marL="1828800" indent="0">
+              <a:buNone/>
+              <a:defRPr sz="8000" b="1"/>
             </a:lvl2pPr>
-            <a:lvl3pPr marL="914451" indent="0">
-              <a:buNone/>
-              <a:defRPr sz="1800" b="1"/>
+            <a:lvl3pPr marL="3657600" indent="0">
+              <a:buNone/>
+              <a:defRPr sz="7200" b="1"/>
             </a:lvl3pPr>
-            <a:lvl4pPr marL="1371676" indent="0">
-              <a:buNone/>
-              <a:defRPr sz="1600" b="1"/>
+            <a:lvl4pPr marL="5486400" indent="0">
+              <a:buNone/>
+              <a:defRPr sz="6400" b="1"/>
             </a:lvl4pPr>
-            <a:lvl5pPr marL="1828902" indent="0">
-              <a:buNone/>
-              <a:defRPr sz="1600" b="1"/>
+            <a:lvl5pPr marL="7315200" indent="0">
+              <a:buNone/>
+              <a:defRPr sz="6400" b="1"/>
             </a:lvl5pPr>
-            <a:lvl6pPr marL="2286127" indent="0">
-              <a:buNone/>
-              <a:defRPr sz="1600" b="1"/>
+            <a:lvl6pPr marL="9144000" indent="0">
+              <a:buNone/>
+              <a:defRPr sz="6400" b="1"/>
             </a:lvl6pPr>
-            <a:lvl7pPr marL="2743353" indent="0">
-              <a:buNone/>
-              <a:defRPr sz="1600" b="1"/>
+            <a:lvl7pPr marL="10972800" indent="0">
+              <a:buNone/>
+              <a:defRPr sz="6400" b="1"/>
             </a:lvl7pPr>
-            <a:lvl8pPr marL="3200578" indent="0">
-              <a:buNone/>
-              <a:defRPr sz="1600" b="1"/>
+            <a:lvl8pPr marL="12801600" indent="0">
+              <a:buNone/>
+              <a:defRPr sz="6400" b="1"/>
             </a:lvl8pPr>
-            <a:lvl9pPr marL="3657804" indent="0">
-              <a:buNone/>
-              <a:defRPr sz="1600" b="1"/>
+            <a:lvl9pPr marL="14630400" indent="0">
+              <a:buNone/>
+              <a:defRPr sz="6400" b="1"/>
             </a:lvl9pPr>
           </a:lstStyle>
           <a:p>
@@ -1435,8 +1435,8 @@
         </p:nvSpPr>
         <p:spPr>
           <a:xfrm>
-            <a:off x="839789" y="2505075"/>
-            <a:ext cx="5157787" cy="3684588"/>
+            <a:off x="3359154" y="10020300"/>
+            <a:ext cx="20631148" cy="14738352"/>
           </a:xfrm>
         </p:spPr>
         <p:txBody>
@@ -1492,8 +1492,8 @@
         </p:nvSpPr>
         <p:spPr>
           <a:xfrm>
-            <a:off x="6172200" y="1681163"/>
-            <a:ext cx="5183188" cy="823912"/>
+            <a:off x="24688800" y="6724652"/>
+            <a:ext cx="20732752" cy="3295648"/>
           </a:xfrm>
         </p:spPr>
         <p:txBody>
@@ -1501,39 +1501,39 @@
           <a:lstStyle>
             <a:lvl1pPr marL="0" indent="0">
               <a:buNone/>
-              <a:defRPr sz="2400" b="1"/>
+              <a:defRPr sz="9600" b="1"/>
             </a:lvl1pPr>
-            <a:lvl2pPr marL="457225" indent="0">
-              <a:buNone/>
-              <a:defRPr sz="2000" b="1"/>
+            <a:lvl2pPr marL="1828800" indent="0">
+              <a:buNone/>
+              <a:defRPr sz="8000" b="1"/>
             </a:lvl2pPr>
-            <a:lvl3pPr marL="914451" indent="0">
-              <a:buNone/>
-              <a:defRPr sz="1800" b="1"/>
+            <a:lvl3pPr marL="3657600" indent="0">
+              <a:buNone/>
+              <a:defRPr sz="7200" b="1"/>
             </a:lvl3pPr>
-            <a:lvl4pPr marL="1371676" indent="0">
-              <a:buNone/>
-              <a:defRPr sz="1600" b="1"/>
+            <a:lvl4pPr marL="5486400" indent="0">
+              <a:buNone/>
+              <a:defRPr sz="6400" b="1"/>
             </a:lvl4pPr>
-            <a:lvl5pPr marL="1828902" indent="0">
-              <a:buNone/>
-              <a:defRPr sz="1600" b="1"/>
+            <a:lvl5pPr marL="7315200" indent="0">
+              <a:buNone/>
+              <a:defRPr sz="6400" b="1"/>
             </a:lvl5pPr>
-            <a:lvl6pPr marL="2286127" indent="0">
-              <a:buNone/>
-              <a:defRPr sz="1600" b="1"/>
+            <a:lvl6pPr marL="9144000" indent="0">
+              <a:buNone/>
+              <a:defRPr sz="6400" b="1"/>
             </a:lvl6pPr>
-            <a:lvl7pPr marL="2743353" indent="0">
-              <a:buNone/>
-              <a:defRPr sz="1600" b="1"/>
+            <a:lvl7pPr marL="10972800" indent="0">
+              <a:buNone/>
+              <a:defRPr sz="6400" b="1"/>
             </a:lvl7pPr>
-            <a:lvl8pPr marL="3200578" indent="0">
-              <a:buNone/>
-              <a:defRPr sz="1600" b="1"/>
+            <a:lvl8pPr marL="12801600" indent="0">
+              <a:buNone/>
+              <a:defRPr sz="6400" b="1"/>
             </a:lvl8pPr>
-            <a:lvl9pPr marL="3657804" indent="0">
-              <a:buNone/>
-              <a:defRPr sz="1600" b="1"/>
+            <a:lvl9pPr marL="14630400" indent="0">
+              <a:buNone/>
+              <a:defRPr sz="6400" b="1"/>
             </a:lvl9pPr>
           </a:lstStyle>
           <a:p>
@@ -1557,8 +1557,8 @@
         </p:nvSpPr>
         <p:spPr>
           <a:xfrm>
-            <a:off x="6172200" y="2505075"/>
-            <a:ext cx="5183188" cy="3684588"/>
+            <a:off x="24688800" y="10020300"/>
+            <a:ext cx="20732752" cy="14738352"/>
           </a:xfrm>
         </p:spPr>
         <p:txBody>
@@ -1619,7 +1619,7 @@
           <a:p>
             <a:fld id="{897FBA0E-E6C1-48AC-A269-B6BACD4E8CFD}" type="datetimeFigureOut">
               <a:rPr lang="zh-CN" altLang="en-US" smtClean="0"/>
-              <a:t>2024/11/20</a:t>
+              <a:t>2025/2/7</a:t>
             </a:fld>
             <a:endParaRPr lang="zh-CN" altLang="en-US"/>
           </a:p>
@@ -1670,7 +1670,7 @@
     </p:spTree>
     <p:extLst>
       <p:ext uri="{BB962C8B-B14F-4D97-AF65-F5344CB8AC3E}">
-        <p14:creationId xmlns:p14="http://schemas.microsoft.com/office/powerpoint/2010/main" val="3449891581"/>
+        <p14:creationId xmlns:p14="http://schemas.microsoft.com/office/powerpoint/2010/main" val="241594128"/>
       </p:ext>
     </p:extLst>
   </p:cSld>
@@ -1737,7 +1737,7 @@
           <a:p>
             <a:fld id="{897FBA0E-E6C1-48AC-A269-B6BACD4E8CFD}" type="datetimeFigureOut">
               <a:rPr lang="zh-CN" altLang="en-US" smtClean="0"/>
-              <a:t>2024/11/20</a:t>
+              <a:t>2025/2/7</a:t>
             </a:fld>
             <a:endParaRPr lang="zh-CN" altLang="en-US"/>
           </a:p>
@@ -1788,7 +1788,7 @@
     </p:spTree>
     <p:extLst>
       <p:ext uri="{BB962C8B-B14F-4D97-AF65-F5344CB8AC3E}">
-        <p14:creationId xmlns:p14="http://schemas.microsoft.com/office/powerpoint/2010/main" val="2440227949"/>
+        <p14:creationId xmlns:p14="http://schemas.microsoft.com/office/powerpoint/2010/main" val="2689099137"/>
       </p:ext>
     </p:extLst>
   </p:cSld>
@@ -1832,7 +1832,7 @@
           <a:p>
             <a:fld id="{897FBA0E-E6C1-48AC-A269-B6BACD4E8CFD}" type="datetimeFigureOut">
               <a:rPr lang="zh-CN" altLang="en-US" smtClean="0"/>
-              <a:t>2024/11/20</a:t>
+              <a:t>2025/2/7</a:t>
             </a:fld>
             <a:endParaRPr lang="zh-CN" altLang="en-US"/>
           </a:p>
@@ -1883,7 +1883,7 @@
     </p:spTree>
     <p:extLst>
       <p:ext uri="{BB962C8B-B14F-4D97-AF65-F5344CB8AC3E}">
-        <p14:creationId xmlns:p14="http://schemas.microsoft.com/office/powerpoint/2010/main" val="2108181704"/>
+        <p14:creationId xmlns:p14="http://schemas.microsoft.com/office/powerpoint/2010/main" val="3630614705"/>
       </p:ext>
     </p:extLst>
   </p:cSld>
@@ -1922,15 +1922,15 @@
         </p:nvSpPr>
         <p:spPr>
           <a:xfrm>
-            <a:off x="839789" y="457200"/>
-            <a:ext cx="3932237" cy="1600200"/>
+            <a:off x="3359154" y="1828800"/>
+            <a:ext cx="15728948" cy="6400800"/>
           </a:xfrm>
         </p:spPr>
         <p:txBody>
           <a:bodyPr anchor="b"/>
           <a:lstStyle>
             <a:lvl1pPr>
-              <a:defRPr sz="3200"/>
+              <a:defRPr sz="12800"/>
             </a:lvl1pPr>
           </a:lstStyle>
           <a:p>
@@ -1954,39 +1954,39 @@
         </p:nvSpPr>
         <p:spPr>
           <a:xfrm>
-            <a:off x="5183188" y="987426"/>
-            <a:ext cx="6172200" cy="4873625"/>
+            <a:off x="20732752" y="3949702"/>
+            <a:ext cx="24688800" cy="19494500"/>
           </a:xfrm>
         </p:spPr>
         <p:txBody>
           <a:bodyPr/>
           <a:lstStyle>
             <a:lvl1pPr>
-              <a:defRPr sz="3200"/>
+              <a:defRPr sz="12800"/>
             </a:lvl1pPr>
             <a:lvl2pPr>
-              <a:defRPr sz="2800"/>
+              <a:defRPr sz="11200"/>
             </a:lvl2pPr>
             <a:lvl3pPr>
-              <a:defRPr sz="2400"/>
+              <a:defRPr sz="9600"/>
             </a:lvl3pPr>
             <a:lvl4pPr>
-              <a:defRPr sz="2000"/>
+              <a:defRPr sz="8000"/>
             </a:lvl4pPr>
             <a:lvl5pPr>
-              <a:defRPr sz="2000"/>
+              <a:defRPr sz="8000"/>
             </a:lvl5pPr>
             <a:lvl6pPr>
-              <a:defRPr sz="2000"/>
+              <a:defRPr sz="8000"/>
             </a:lvl6pPr>
             <a:lvl7pPr>
-              <a:defRPr sz="2000"/>
+              <a:defRPr sz="8000"/>
             </a:lvl7pPr>
             <a:lvl8pPr>
-              <a:defRPr sz="2000"/>
+              <a:defRPr sz="8000"/>
             </a:lvl8pPr>
             <a:lvl9pPr>
-              <a:defRPr sz="2000"/>
+              <a:defRPr sz="8000"/>
             </a:lvl9pPr>
           </a:lstStyle>
           <a:p>
@@ -2039,8 +2039,8 @@
         </p:nvSpPr>
         <p:spPr>
           <a:xfrm>
-            <a:off x="839789" y="2057400"/>
-            <a:ext cx="3932237" cy="3811588"/>
+            <a:off x="3359154" y="8229600"/>
+            <a:ext cx="15728948" cy="15246352"/>
           </a:xfrm>
         </p:spPr>
         <p:txBody>
@@ -2048,39 +2048,39 @@
           <a:lstStyle>
             <a:lvl1pPr marL="0" indent="0">
               <a:buNone/>
-              <a:defRPr sz="1600"/>
+              <a:defRPr sz="6400"/>
             </a:lvl1pPr>
-            <a:lvl2pPr marL="457225" indent="0">
-              <a:buNone/>
-              <a:defRPr sz="1400"/>
+            <a:lvl2pPr marL="1828800" indent="0">
+              <a:buNone/>
+              <a:defRPr sz="5600"/>
             </a:lvl2pPr>
-            <a:lvl3pPr marL="914451" indent="0">
-              <a:buNone/>
-              <a:defRPr sz="1200"/>
+            <a:lvl3pPr marL="3657600" indent="0">
+              <a:buNone/>
+              <a:defRPr sz="4800"/>
             </a:lvl3pPr>
-            <a:lvl4pPr marL="1371676" indent="0">
-              <a:buNone/>
-              <a:defRPr sz="1000"/>
+            <a:lvl4pPr marL="5486400" indent="0">
+              <a:buNone/>
+              <a:defRPr sz="4000"/>
             </a:lvl4pPr>
-            <a:lvl5pPr marL="1828902" indent="0">
-              <a:buNone/>
-              <a:defRPr sz="1000"/>
+            <a:lvl5pPr marL="7315200" indent="0">
+              <a:buNone/>
+              <a:defRPr sz="4000"/>
             </a:lvl5pPr>
-            <a:lvl6pPr marL="2286127" indent="0">
-              <a:buNone/>
-              <a:defRPr sz="1000"/>
+            <a:lvl6pPr marL="9144000" indent="0">
+              <a:buNone/>
+              <a:defRPr sz="4000"/>
             </a:lvl6pPr>
-            <a:lvl7pPr marL="2743353" indent="0">
-              <a:buNone/>
-              <a:defRPr sz="1000"/>
+            <a:lvl7pPr marL="10972800" indent="0">
+              <a:buNone/>
+              <a:defRPr sz="4000"/>
             </a:lvl7pPr>
-            <a:lvl8pPr marL="3200578" indent="0">
-              <a:buNone/>
-              <a:defRPr sz="1000"/>
+            <a:lvl8pPr marL="12801600" indent="0">
+              <a:buNone/>
+              <a:defRPr sz="4000"/>
             </a:lvl8pPr>
-            <a:lvl9pPr marL="3657804" indent="0">
-              <a:buNone/>
-              <a:defRPr sz="1000"/>
+            <a:lvl9pPr marL="14630400" indent="0">
+              <a:buNone/>
+              <a:defRPr sz="4000"/>
             </a:lvl9pPr>
           </a:lstStyle>
           <a:p>
@@ -2109,7 +2109,7 @@
           <a:p>
             <a:fld id="{897FBA0E-E6C1-48AC-A269-B6BACD4E8CFD}" type="datetimeFigureOut">
               <a:rPr lang="zh-CN" altLang="en-US" smtClean="0"/>
-              <a:t>2024/11/20</a:t>
+              <a:t>2025/2/7</a:t>
             </a:fld>
             <a:endParaRPr lang="zh-CN" altLang="en-US"/>
           </a:p>
@@ -2160,7 +2160,7 @@
     </p:spTree>
     <p:extLst>
       <p:ext uri="{BB962C8B-B14F-4D97-AF65-F5344CB8AC3E}">
-        <p14:creationId xmlns:p14="http://schemas.microsoft.com/office/powerpoint/2010/main" val="2758009816"/>
+        <p14:creationId xmlns:p14="http://schemas.microsoft.com/office/powerpoint/2010/main" val="141089530"/>
       </p:ext>
     </p:extLst>
   </p:cSld>
@@ -2199,15 +2199,15 @@
         </p:nvSpPr>
         <p:spPr>
           <a:xfrm>
-            <a:off x="839789" y="457200"/>
-            <a:ext cx="3932237" cy="1600200"/>
+            <a:off x="3359154" y="1828800"/>
+            <a:ext cx="15728948" cy="6400800"/>
           </a:xfrm>
         </p:spPr>
         <p:txBody>
           <a:bodyPr anchor="b"/>
           <a:lstStyle>
             <a:lvl1pPr>
-              <a:defRPr sz="3200"/>
+              <a:defRPr sz="12800"/>
             </a:lvl1pPr>
           </a:lstStyle>
           <a:p>
@@ -2231,8 +2231,8 @@
         </p:nvSpPr>
         <p:spPr>
           <a:xfrm>
-            <a:off x="5183188" y="987426"/>
-            <a:ext cx="6172200" cy="4873625"/>
+            <a:off x="20732752" y="3949702"/>
+            <a:ext cx="24688800" cy="19494500"/>
           </a:xfrm>
         </p:spPr>
         <p:txBody>
@@ -2240,39 +2240,39 @@
           <a:lstStyle>
             <a:lvl1pPr marL="0" indent="0">
               <a:buNone/>
-              <a:defRPr sz="3200"/>
+              <a:defRPr sz="12800"/>
             </a:lvl1pPr>
-            <a:lvl2pPr marL="457225" indent="0">
-              <a:buNone/>
-              <a:defRPr sz="2800"/>
+            <a:lvl2pPr marL="1828800" indent="0">
+              <a:buNone/>
+              <a:defRPr sz="11200"/>
             </a:lvl2pPr>
-            <a:lvl3pPr marL="914451" indent="0">
-              <a:buNone/>
-              <a:defRPr sz="2400"/>
+            <a:lvl3pPr marL="3657600" indent="0">
+              <a:buNone/>
+              <a:defRPr sz="9600"/>
             </a:lvl3pPr>
-            <a:lvl4pPr marL="1371676" indent="0">
-              <a:buNone/>
-              <a:defRPr sz="2000"/>
+            <a:lvl4pPr marL="5486400" indent="0">
+              <a:buNone/>
+              <a:defRPr sz="8000"/>
             </a:lvl4pPr>
-            <a:lvl5pPr marL="1828902" indent="0">
-              <a:buNone/>
-              <a:defRPr sz="2000"/>
+            <a:lvl5pPr marL="7315200" indent="0">
+              <a:buNone/>
+              <a:defRPr sz="8000"/>
             </a:lvl5pPr>
-            <a:lvl6pPr marL="2286127" indent="0">
-              <a:buNone/>
-              <a:defRPr sz="2000"/>
+            <a:lvl6pPr marL="9144000" indent="0">
+              <a:buNone/>
+              <a:defRPr sz="8000"/>
             </a:lvl6pPr>
-            <a:lvl7pPr marL="2743353" indent="0">
-              <a:buNone/>
-              <a:defRPr sz="2000"/>
+            <a:lvl7pPr marL="10972800" indent="0">
+              <a:buNone/>
+              <a:defRPr sz="8000"/>
             </a:lvl7pPr>
-            <a:lvl8pPr marL="3200578" indent="0">
-              <a:buNone/>
-              <a:defRPr sz="2000"/>
+            <a:lvl8pPr marL="12801600" indent="0">
+              <a:buNone/>
+              <a:defRPr sz="8000"/>
             </a:lvl8pPr>
-            <a:lvl9pPr marL="3657804" indent="0">
-              <a:buNone/>
-              <a:defRPr sz="2000"/>
+            <a:lvl9pPr marL="14630400" indent="0">
+              <a:buNone/>
+              <a:defRPr sz="8000"/>
             </a:lvl9pPr>
           </a:lstStyle>
           <a:p>
@@ -2296,8 +2296,8 @@
         </p:nvSpPr>
         <p:spPr>
           <a:xfrm>
-            <a:off x="839789" y="2057400"/>
-            <a:ext cx="3932237" cy="3811588"/>
+            <a:off x="3359154" y="8229600"/>
+            <a:ext cx="15728948" cy="15246352"/>
           </a:xfrm>
         </p:spPr>
         <p:txBody>
@@ -2305,39 +2305,39 @@
           <a:lstStyle>
             <a:lvl1pPr marL="0" indent="0">
               <a:buNone/>
-              <a:defRPr sz="1600"/>
+              <a:defRPr sz="6400"/>
             </a:lvl1pPr>
-            <a:lvl2pPr marL="457225" indent="0">
-              <a:buNone/>
-              <a:defRPr sz="1400"/>
+            <a:lvl2pPr marL="1828800" indent="0">
+              <a:buNone/>
+              <a:defRPr sz="5600"/>
             </a:lvl2pPr>
-            <a:lvl3pPr marL="914451" indent="0">
-              <a:buNone/>
-              <a:defRPr sz="1200"/>
+            <a:lvl3pPr marL="3657600" indent="0">
+              <a:buNone/>
+              <a:defRPr sz="4800"/>
             </a:lvl3pPr>
-            <a:lvl4pPr marL="1371676" indent="0">
-              <a:buNone/>
-              <a:defRPr sz="1000"/>
+            <a:lvl4pPr marL="5486400" indent="0">
+              <a:buNone/>
+              <a:defRPr sz="4000"/>
             </a:lvl4pPr>
-            <a:lvl5pPr marL="1828902" indent="0">
-              <a:buNone/>
-              <a:defRPr sz="1000"/>
+            <a:lvl5pPr marL="7315200" indent="0">
+              <a:buNone/>
+              <a:defRPr sz="4000"/>
             </a:lvl5pPr>
-            <a:lvl6pPr marL="2286127" indent="0">
-              <a:buNone/>
-              <a:defRPr sz="1000"/>
+            <a:lvl6pPr marL="9144000" indent="0">
+              <a:buNone/>
+              <a:defRPr sz="4000"/>
             </a:lvl6pPr>
-            <a:lvl7pPr marL="2743353" indent="0">
-              <a:buNone/>
-              <a:defRPr sz="1000"/>
+            <a:lvl7pPr marL="10972800" indent="0">
+              <a:buNone/>
+              <a:defRPr sz="4000"/>
             </a:lvl7pPr>
-            <a:lvl8pPr marL="3200578" indent="0">
-              <a:buNone/>
-              <a:defRPr sz="1000"/>
+            <a:lvl8pPr marL="12801600" indent="0">
+              <a:buNone/>
+              <a:defRPr sz="4000"/>
             </a:lvl8pPr>
-            <a:lvl9pPr marL="3657804" indent="0">
-              <a:buNone/>
-              <a:defRPr sz="1000"/>
+            <a:lvl9pPr marL="14630400" indent="0">
+              <a:buNone/>
+              <a:defRPr sz="4000"/>
             </a:lvl9pPr>
           </a:lstStyle>
           <a:p>
@@ -2366,7 +2366,7 @@
           <a:p>
             <a:fld id="{897FBA0E-E6C1-48AC-A269-B6BACD4E8CFD}" type="datetimeFigureOut">
               <a:rPr lang="zh-CN" altLang="en-US" smtClean="0"/>
-              <a:t>2024/11/20</a:t>
+              <a:t>2025/2/7</a:t>
             </a:fld>
             <a:endParaRPr lang="zh-CN" altLang="en-US"/>
           </a:p>
@@ -2417,7 +2417,7 @@
     </p:spTree>
     <p:extLst>
       <p:ext uri="{BB962C8B-B14F-4D97-AF65-F5344CB8AC3E}">
-        <p14:creationId xmlns:p14="http://schemas.microsoft.com/office/powerpoint/2010/main" val="2261285496"/>
+        <p14:creationId xmlns:p14="http://schemas.microsoft.com/office/powerpoint/2010/main" val="3489368877"/>
       </p:ext>
     </p:extLst>
   </p:cSld>
@@ -2461,8 +2461,8 @@
         </p:nvSpPr>
         <p:spPr>
           <a:xfrm>
-            <a:off x="838200" y="365125"/>
-            <a:ext cx="10515600" cy="1325563"/>
+            <a:off x="3352800" y="1460502"/>
+            <a:ext cx="42062400" cy="5302252"/>
           </a:xfrm>
           <a:prstGeom prst="rect">
             <a:avLst/>
@@ -2494,8 +2494,8 @@
         </p:nvSpPr>
         <p:spPr>
           <a:xfrm>
-            <a:off x="838200" y="1825625"/>
-            <a:ext cx="10515600" cy="4351338"/>
+            <a:off x="3352800" y="7302500"/>
+            <a:ext cx="42062400" cy="17405352"/>
           </a:xfrm>
           <a:prstGeom prst="rect">
             <a:avLst/>
@@ -2556,8 +2556,8 @@
         </p:nvSpPr>
         <p:spPr>
           <a:xfrm>
-            <a:off x="838200" y="6356351"/>
-            <a:ext cx="2743200" cy="365125"/>
+            <a:off x="3352800" y="25425402"/>
+            <a:ext cx="10972800" cy="1460500"/>
           </a:xfrm>
           <a:prstGeom prst="rect">
             <a:avLst/>
@@ -2567,7 +2567,7 @@
           <a:bodyPr vert="horz" lIns="91440" tIns="45720" rIns="91440" bIns="45720" rtlCol="0" anchor="ctr"/>
           <a:lstStyle>
             <a:lvl1pPr algn="l">
-              <a:defRPr sz="1200">
+              <a:defRPr sz="4800">
                 <a:solidFill>
                   <a:schemeClr val="tx1">
                     <a:tint val="75000"/>
@@ -2579,7 +2579,7 @@
           <a:p>
             <a:fld id="{897FBA0E-E6C1-48AC-A269-B6BACD4E8CFD}" type="datetimeFigureOut">
               <a:rPr lang="zh-CN" altLang="en-US" smtClean="0"/>
-              <a:t>2024/11/20</a:t>
+              <a:t>2025/2/7</a:t>
             </a:fld>
             <a:endParaRPr lang="zh-CN" altLang="en-US"/>
           </a:p>
@@ -2597,8 +2597,8 @@
         </p:nvSpPr>
         <p:spPr>
           <a:xfrm>
-            <a:off x="4038600" y="6356351"/>
-            <a:ext cx="4114800" cy="365125"/>
+            <a:off x="16154400" y="25425402"/>
+            <a:ext cx="16459200" cy="1460500"/>
           </a:xfrm>
           <a:prstGeom prst="rect">
             <a:avLst/>
@@ -2608,7 +2608,7 @@
           <a:bodyPr vert="horz" lIns="91440" tIns="45720" rIns="91440" bIns="45720" rtlCol="0" anchor="ctr"/>
           <a:lstStyle>
             <a:lvl1pPr algn="ctr">
-              <a:defRPr sz="1200">
+              <a:defRPr sz="4800">
                 <a:solidFill>
                   <a:schemeClr val="tx1">
                     <a:tint val="75000"/>
@@ -2634,8 +2634,8 @@
         </p:nvSpPr>
         <p:spPr>
           <a:xfrm>
-            <a:off x="8610600" y="6356351"/>
-            <a:ext cx="2743200" cy="365125"/>
+            <a:off x="34442400" y="25425402"/>
+            <a:ext cx="10972800" cy="1460500"/>
           </a:xfrm>
           <a:prstGeom prst="rect">
             <a:avLst/>
@@ -2645,7 +2645,7 @@
           <a:bodyPr vert="horz" lIns="91440" tIns="45720" rIns="91440" bIns="45720" rtlCol="0" anchor="ctr"/>
           <a:lstStyle>
             <a:lvl1pPr algn="r">
-              <a:defRPr sz="1200">
+              <a:defRPr sz="4800">
                 <a:solidFill>
                   <a:schemeClr val="tx1">
                     <a:tint val="75000"/>
@@ -2666,27 +2666,27 @@
     </p:spTree>
     <p:extLst>
       <p:ext uri="{BB962C8B-B14F-4D97-AF65-F5344CB8AC3E}">
-        <p14:creationId xmlns:p14="http://schemas.microsoft.com/office/powerpoint/2010/main" val="4017259116"/>
+        <p14:creationId xmlns:p14="http://schemas.microsoft.com/office/powerpoint/2010/main" val="4161237002"/>
       </p:ext>
     </p:extLst>
   </p:cSld>
   <p:clrMap bg1="lt1" tx1="dk1" bg2="lt2" tx2="dk2" accent1="accent1" accent2="accent2" accent3="accent3" accent4="accent4" accent5="accent5" accent6="accent6" hlink="hlink" folHlink="folHlink"/>
   <p:sldLayoutIdLst>
-    <p:sldLayoutId id="2147483661" r:id="rId1"/>
-    <p:sldLayoutId id="2147483662" r:id="rId2"/>
-    <p:sldLayoutId id="2147483663" r:id="rId3"/>
-    <p:sldLayoutId id="2147483664" r:id="rId4"/>
-    <p:sldLayoutId id="2147483665" r:id="rId5"/>
-    <p:sldLayoutId id="2147483666" r:id="rId6"/>
-    <p:sldLayoutId id="2147483667" r:id="rId7"/>
-    <p:sldLayoutId id="2147483668" r:id="rId8"/>
-    <p:sldLayoutId id="2147483669" r:id="rId9"/>
-    <p:sldLayoutId id="2147483670" r:id="rId10"/>
-    <p:sldLayoutId id="2147483671" r:id="rId11"/>
+    <p:sldLayoutId id="2147483685" r:id="rId1"/>
+    <p:sldLayoutId id="2147483686" r:id="rId2"/>
+    <p:sldLayoutId id="2147483687" r:id="rId3"/>
+    <p:sldLayoutId id="2147483688" r:id="rId4"/>
+    <p:sldLayoutId id="2147483689" r:id="rId5"/>
+    <p:sldLayoutId id="2147483690" r:id="rId6"/>
+    <p:sldLayoutId id="2147483691" r:id="rId7"/>
+    <p:sldLayoutId id="2147483692" r:id="rId8"/>
+    <p:sldLayoutId id="2147483693" r:id="rId9"/>
+    <p:sldLayoutId id="2147483694" r:id="rId10"/>
+    <p:sldLayoutId id="2147483695" r:id="rId11"/>
   </p:sldLayoutIdLst>
   <p:txStyles>
     <p:titleStyle>
-      <a:lvl1pPr algn="l" defTabSz="914451" rtl="0" eaLnBrk="1" latinLnBrk="0" hangingPunct="1">
+      <a:lvl1pPr algn="l" defTabSz="3657600" rtl="0" eaLnBrk="1" latinLnBrk="0" hangingPunct="1">
         <a:lnSpc>
           <a:spcPct val="90000"/>
         </a:lnSpc>
@@ -2694,7 +2694,7 @@
           <a:spcPct val="0"/>
         </a:spcBef>
         <a:buNone/>
-        <a:defRPr sz="4400" kern="1200">
+        <a:defRPr sz="17600" kern="1200">
           <a:solidFill>
             <a:schemeClr val="tx1"/>
           </a:solidFill>
@@ -2705,16 +2705,16 @@
       </a:lvl1pPr>
     </p:titleStyle>
     <p:bodyStyle>
-      <a:lvl1pPr marL="228613" indent="-228613" algn="l" defTabSz="914451" rtl="0" eaLnBrk="1" latinLnBrk="0" hangingPunct="1">
+      <a:lvl1pPr marL="914400" indent="-914400" algn="l" defTabSz="3657600" rtl="0" eaLnBrk="1" latinLnBrk="0" hangingPunct="1">
         <a:lnSpc>
           <a:spcPct val="90000"/>
         </a:lnSpc>
         <a:spcBef>
-          <a:spcPts val="1000"/>
+          <a:spcPts val="4000"/>
         </a:spcBef>
         <a:buFont typeface="Arial" panose="020B0604020202020204" pitchFamily="34" charset="0"/>
         <a:buChar char="•"/>
-        <a:defRPr sz="2800" kern="1200">
+        <a:defRPr sz="11200" kern="1200">
           <a:solidFill>
             <a:schemeClr val="tx1"/>
           </a:solidFill>
@@ -2723,16 +2723,16 @@
           <a:cs typeface="+mn-cs"/>
         </a:defRPr>
       </a:lvl1pPr>
-      <a:lvl2pPr marL="685838" indent="-228613" algn="l" defTabSz="914451" rtl="0" eaLnBrk="1" latinLnBrk="0" hangingPunct="1">
+      <a:lvl2pPr marL="2743200" indent="-914400" algn="l" defTabSz="3657600" rtl="0" eaLnBrk="1" latinLnBrk="0" hangingPunct="1">
         <a:lnSpc>
           <a:spcPct val="90000"/>
         </a:lnSpc>
         <a:spcBef>
-          <a:spcPts val="500"/>
+          <a:spcPts val="2000"/>
         </a:spcBef>
         <a:buFont typeface="Arial" panose="020B0604020202020204" pitchFamily="34" charset="0"/>
         <a:buChar char="•"/>
-        <a:defRPr sz="2400" kern="1200">
+        <a:defRPr sz="9600" kern="1200">
           <a:solidFill>
             <a:schemeClr val="tx1"/>
           </a:solidFill>
@@ -2741,16 +2741,16 @@
           <a:cs typeface="+mn-cs"/>
         </a:defRPr>
       </a:lvl2pPr>
-      <a:lvl3pPr marL="1143064" indent="-228613" algn="l" defTabSz="914451" rtl="0" eaLnBrk="1" latinLnBrk="0" hangingPunct="1">
+      <a:lvl3pPr marL="4572000" indent="-914400" algn="l" defTabSz="3657600" rtl="0" eaLnBrk="1" latinLnBrk="0" hangingPunct="1">
         <a:lnSpc>
           <a:spcPct val="90000"/>
         </a:lnSpc>
         <a:spcBef>
-          <a:spcPts val="500"/>
+          <a:spcPts val="2000"/>
         </a:spcBef>
         <a:buFont typeface="Arial" panose="020B0604020202020204" pitchFamily="34" charset="0"/>
         <a:buChar char="•"/>
-        <a:defRPr sz="2000" kern="1200">
+        <a:defRPr sz="8000" kern="1200">
           <a:solidFill>
             <a:schemeClr val="tx1"/>
           </a:solidFill>
@@ -2759,16 +2759,16 @@
           <a:cs typeface="+mn-cs"/>
         </a:defRPr>
       </a:lvl3pPr>
-      <a:lvl4pPr marL="1600289" indent="-228613" algn="l" defTabSz="914451" rtl="0" eaLnBrk="1" latinLnBrk="0" hangingPunct="1">
+      <a:lvl4pPr marL="6400800" indent="-914400" algn="l" defTabSz="3657600" rtl="0" eaLnBrk="1" latinLnBrk="0" hangingPunct="1">
         <a:lnSpc>
           <a:spcPct val="90000"/>
         </a:lnSpc>
         <a:spcBef>
-          <a:spcPts val="500"/>
+          <a:spcPts val="2000"/>
         </a:spcBef>
         <a:buFont typeface="Arial" panose="020B0604020202020204" pitchFamily="34" charset="0"/>
         <a:buChar char="•"/>
-        <a:defRPr sz="1800" kern="1200">
+        <a:defRPr sz="7200" kern="1200">
           <a:solidFill>
             <a:schemeClr val="tx1"/>
           </a:solidFill>
@@ -2777,16 +2777,16 @@
           <a:cs typeface="+mn-cs"/>
         </a:defRPr>
       </a:lvl4pPr>
-      <a:lvl5pPr marL="2057515" indent="-228613" algn="l" defTabSz="914451" rtl="0" eaLnBrk="1" latinLnBrk="0" hangingPunct="1">
+      <a:lvl5pPr marL="8229600" indent="-914400" algn="l" defTabSz="3657600" rtl="0" eaLnBrk="1" latinLnBrk="0" hangingPunct="1">
         <a:lnSpc>
           <a:spcPct val="90000"/>
         </a:lnSpc>
         <a:spcBef>
-          <a:spcPts val="500"/>
+          <a:spcPts val="2000"/>
         </a:spcBef>
         <a:buFont typeface="Arial" panose="020B0604020202020204" pitchFamily="34" charset="0"/>
         <a:buChar char="•"/>
-        <a:defRPr sz="1800" kern="1200">
+        <a:defRPr sz="7200" kern="1200">
           <a:solidFill>
             <a:schemeClr val="tx1"/>
           </a:solidFill>
@@ -2795,16 +2795,16 @@
           <a:cs typeface="+mn-cs"/>
         </a:defRPr>
       </a:lvl5pPr>
-      <a:lvl6pPr marL="2514740" indent="-228613" algn="l" defTabSz="914451" rtl="0" eaLnBrk="1" latinLnBrk="0" hangingPunct="1">
+      <a:lvl6pPr marL="10058400" indent="-914400" algn="l" defTabSz="3657600" rtl="0" eaLnBrk="1" latinLnBrk="0" hangingPunct="1">
         <a:lnSpc>
           <a:spcPct val="90000"/>
         </a:lnSpc>
         <a:spcBef>
-          <a:spcPts val="500"/>
+          <a:spcPts val="2000"/>
         </a:spcBef>
         <a:buFont typeface="Arial" panose="020B0604020202020204" pitchFamily="34" charset="0"/>
         <a:buChar char="•"/>
-        <a:defRPr sz="1800" kern="1200">
+        <a:defRPr sz="7200" kern="1200">
           <a:solidFill>
             <a:schemeClr val="tx1"/>
           </a:solidFill>
@@ -2813,16 +2813,16 @@
           <a:cs typeface="+mn-cs"/>
         </a:defRPr>
       </a:lvl6pPr>
-      <a:lvl7pPr marL="2971966" indent="-228613" algn="l" defTabSz="914451" rtl="0" eaLnBrk="1" latinLnBrk="0" hangingPunct="1">
+      <a:lvl7pPr marL="11887200" indent="-914400" algn="l" defTabSz="3657600" rtl="0" eaLnBrk="1" latinLnBrk="0" hangingPunct="1">
         <a:lnSpc>
           <a:spcPct val="90000"/>
         </a:lnSpc>
         <a:spcBef>
-          <a:spcPts val="500"/>
+          <a:spcPts val="2000"/>
         </a:spcBef>
         <a:buFont typeface="Arial" panose="020B0604020202020204" pitchFamily="34" charset="0"/>
         <a:buChar char="•"/>
-        <a:defRPr sz="1800" kern="1200">
+        <a:defRPr sz="7200" kern="1200">
           <a:solidFill>
             <a:schemeClr val="tx1"/>
           </a:solidFill>
@@ -2831,16 +2831,16 @@
           <a:cs typeface="+mn-cs"/>
         </a:defRPr>
       </a:lvl7pPr>
-      <a:lvl8pPr marL="3429191" indent="-228613" algn="l" defTabSz="914451" rtl="0" eaLnBrk="1" latinLnBrk="0" hangingPunct="1">
+      <a:lvl8pPr marL="13716000" indent="-914400" algn="l" defTabSz="3657600" rtl="0" eaLnBrk="1" latinLnBrk="0" hangingPunct="1">
         <a:lnSpc>
           <a:spcPct val="90000"/>
         </a:lnSpc>
         <a:spcBef>
-          <a:spcPts val="500"/>
+          <a:spcPts val="2000"/>
         </a:spcBef>
         <a:buFont typeface="Arial" panose="020B0604020202020204" pitchFamily="34" charset="0"/>
         <a:buChar char="•"/>
-        <a:defRPr sz="1800" kern="1200">
+        <a:defRPr sz="7200" kern="1200">
           <a:solidFill>
             <a:schemeClr val="tx1"/>
           </a:solidFill>
@@ -2849,16 +2849,16 @@
           <a:cs typeface="+mn-cs"/>
         </a:defRPr>
       </a:lvl8pPr>
-      <a:lvl9pPr marL="3886417" indent="-228613" algn="l" defTabSz="914451" rtl="0" eaLnBrk="1" latinLnBrk="0" hangingPunct="1">
+      <a:lvl9pPr marL="15544800" indent="-914400" algn="l" defTabSz="3657600" rtl="0" eaLnBrk="1" latinLnBrk="0" hangingPunct="1">
         <a:lnSpc>
           <a:spcPct val="90000"/>
         </a:lnSpc>
         <a:spcBef>
-          <a:spcPts val="500"/>
+          <a:spcPts val="2000"/>
         </a:spcBef>
         <a:buFont typeface="Arial" panose="020B0604020202020204" pitchFamily="34" charset="0"/>
         <a:buChar char="•"/>
-        <a:defRPr sz="1800" kern="1200">
+        <a:defRPr sz="7200" kern="1200">
           <a:solidFill>
             <a:schemeClr val="tx1"/>
           </a:solidFill>
@@ -2872,8 +2872,8 @@
       <a:defPPr>
         <a:defRPr lang="en-US"/>
       </a:defPPr>
-      <a:lvl1pPr marL="0" algn="l" defTabSz="914451" rtl="0" eaLnBrk="1" latinLnBrk="0" hangingPunct="1">
-        <a:defRPr sz="1800" kern="1200">
+      <a:lvl1pPr marL="0" algn="l" defTabSz="3657600" rtl="0" eaLnBrk="1" latinLnBrk="0" hangingPunct="1">
+        <a:defRPr sz="7200" kern="1200">
           <a:solidFill>
             <a:schemeClr val="tx1"/>
           </a:solidFill>
@@ -2882,8 +2882,8 @@
           <a:cs typeface="+mn-cs"/>
         </a:defRPr>
       </a:lvl1pPr>
-      <a:lvl2pPr marL="457225" algn="l" defTabSz="914451" rtl="0" eaLnBrk="1" latinLnBrk="0" hangingPunct="1">
-        <a:defRPr sz="1800" kern="1200">
+      <a:lvl2pPr marL="1828800" algn="l" defTabSz="3657600" rtl="0" eaLnBrk="1" latinLnBrk="0" hangingPunct="1">
+        <a:defRPr sz="7200" kern="1200">
           <a:solidFill>
             <a:schemeClr val="tx1"/>
           </a:solidFill>
@@ -2892,8 +2892,8 @@
           <a:cs typeface="+mn-cs"/>
         </a:defRPr>
       </a:lvl2pPr>
-      <a:lvl3pPr marL="914451" algn="l" defTabSz="914451" rtl="0" eaLnBrk="1" latinLnBrk="0" hangingPunct="1">
-        <a:defRPr sz="1800" kern="1200">
+      <a:lvl3pPr marL="3657600" algn="l" defTabSz="3657600" rtl="0" eaLnBrk="1" latinLnBrk="0" hangingPunct="1">
+        <a:defRPr sz="7200" kern="1200">
           <a:solidFill>
             <a:schemeClr val="tx1"/>
           </a:solidFill>
@@ -2902,8 +2902,8 @@
           <a:cs typeface="+mn-cs"/>
         </a:defRPr>
       </a:lvl3pPr>
-      <a:lvl4pPr marL="1371676" algn="l" defTabSz="914451" rtl="0" eaLnBrk="1" latinLnBrk="0" hangingPunct="1">
-        <a:defRPr sz="1800" kern="1200">
+      <a:lvl4pPr marL="5486400" algn="l" defTabSz="3657600" rtl="0" eaLnBrk="1" latinLnBrk="0" hangingPunct="1">
+        <a:defRPr sz="7200" kern="1200">
           <a:solidFill>
             <a:schemeClr val="tx1"/>
           </a:solidFill>
@@ -2912,8 +2912,8 @@
           <a:cs typeface="+mn-cs"/>
         </a:defRPr>
       </a:lvl4pPr>
-      <a:lvl5pPr marL="1828902" algn="l" defTabSz="914451" rtl="0" eaLnBrk="1" latinLnBrk="0" hangingPunct="1">
-        <a:defRPr sz="1800" kern="1200">
+      <a:lvl5pPr marL="7315200" algn="l" defTabSz="3657600" rtl="0" eaLnBrk="1" latinLnBrk="0" hangingPunct="1">
+        <a:defRPr sz="7200" kern="1200">
           <a:solidFill>
             <a:schemeClr val="tx1"/>
           </a:solidFill>
@@ -2922,8 +2922,8 @@
           <a:cs typeface="+mn-cs"/>
         </a:defRPr>
       </a:lvl5pPr>
-      <a:lvl6pPr marL="2286127" algn="l" defTabSz="914451" rtl="0" eaLnBrk="1" latinLnBrk="0" hangingPunct="1">
-        <a:defRPr sz="1800" kern="1200">
+      <a:lvl6pPr marL="9144000" algn="l" defTabSz="3657600" rtl="0" eaLnBrk="1" latinLnBrk="0" hangingPunct="1">
+        <a:defRPr sz="7200" kern="1200">
           <a:solidFill>
             <a:schemeClr val="tx1"/>
           </a:solidFill>
@@ -2932,8 +2932,8 @@
           <a:cs typeface="+mn-cs"/>
         </a:defRPr>
       </a:lvl6pPr>
-      <a:lvl7pPr marL="2743353" algn="l" defTabSz="914451" rtl="0" eaLnBrk="1" latinLnBrk="0" hangingPunct="1">
-        <a:defRPr sz="1800" kern="1200">
+      <a:lvl7pPr marL="10972800" algn="l" defTabSz="3657600" rtl="0" eaLnBrk="1" latinLnBrk="0" hangingPunct="1">
+        <a:defRPr sz="7200" kern="1200">
           <a:solidFill>
             <a:schemeClr val="tx1"/>
           </a:solidFill>
@@ -2942,8 +2942,8 @@
           <a:cs typeface="+mn-cs"/>
         </a:defRPr>
       </a:lvl7pPr>
-      <a:lvl8pPr marL="3200578" algn="l" defTabSz="914451" rtl="0" eaLnBrk="1" latinLnBrk="0" hangingPunct="1">
-        <a:defRPr sz="1800" kern="1200">
+      <a:lvl8pPr marL="12801600" algn="l" defTabSz="3657600" rtl="0" eaLnBrk="1" latinLnBrk="0" hangingPunct="1">
+        <a:defRPr sz="7200" kern="1200">
           <a:solidFill>
             <a:schemeClr val="tx1"/>
           </a:solidFill>
@@ -2952,8 +2952,8 @@
           <a:cs typeface="+mn-cs"/>
         </a:defRPr>
       </a:lvl8pPr>
-      <a:lvl9pPr marL="3657804" algn="l" defTabSz="914451" rtl="0" eaLnBrk="1" latinLnBrk="0" hangingPunct="1">
-        <a:defRPr sz="1800" kern="1200">
+      <a:lvl9pPr marL="14630400" algn="l" defTabSz="3657600" rtl="0" eaLnBrk="1" latinLnBrk="0" hangingPunct="1">
+        <a:defRPr sz="7200" kern="1200">
           <a:solidFill>
             <a:schemeClr val="tx1"/>
           </a:solidFill>
@@ -3000,10 +3000,100 @@
       </p:grpSpPr>
       <p:sp>
         <p:nvSpPr>
-          <p:cNvPr id="9" name="矩形 8">
+          <p:cNvPr id="17" name="文本框 16">
             <a:extLst>
               <a:ext uri="{FF2B5EF4-FFF2-40B4-BE49-F238E27FC236}">
-                <a16:creationId xmlns:a16="http://schemas.microsoft.com/office/drawing/2014/main" id="{70730628-E2FA-1379-8A19-150A9FBBA21E}"/>
+                <a16:creationId xmlns:a16="http://schemas.microsoft.com/office/drawing/2014/main" id="{98D68A1E-7AAC-3AB5-6A84-F15E7E951D25}"/>
+              </a:ext>
+            </a:extLst>
+          </p:cNvPr>
+          <p:cNvSpPr txBox="1"/>
+          <p:nvPr/>
+        </p:nvSpPr>
+        <p:spPr>
+          <a:xfrm>
+            <a:off x="9599355" y="2240347"/>
+            <a:ext cx="5250155" cy="1612749"/>
+          </a:xfrm>
+          <a:prstGeom prst="rect">
+            <a:avLst/>
+          </a:prstGeom>
+          <a:noFill/>
+        </p:spPr>
+        <p:txBody>
+          <a:bodyPr wrap="none" rtlCol="0">
+            <a:spAutoFit/>
+          </a:bodyPr>
+          <a:lstStyle/>
+          <a:p>
+            <a:pPr defTabSz="806500"/>
+            <a:r>
+              <a:rPr lang="zh-CN" altLang="en-US" sz="9880" b="1" dirty="0">
+                <a:solidFill>
+                  <a:srgbClr val="70AD47">
+                    <a:lumMod val="20000"/>
+                    <a:lumOff val="80000"/>
+                  </a:srgbClr>
+                </a:solidFill>
+                <a:latin typeface="Calibri" panose="020F0502020204030204"/>
+                <a:ea typeface="等线" panose="02010600030101010101" pitchFamily="2" charset="-122"/>
+              </a:rPr>
+              <a:t>临时文件</a:t>
+            </a:r>
+          </a:p>
+        </p:txBody>
+      </p:sp>
+      <p:sp>
+        <p:nvSpPr>
+          <p:cNvPr id="21" name="文本框 20">
+            <a:extLst>
+              <a:ext uri="{FF2B5EF4-FFF2-40B4-BE49-F238E27FC236}">
+                <a16:creationId xmlns:a16="http://schemas.microsoft.com/office/drawing/2014/main" id="{676EC5DB-12DE-1235-61F9-CBBA3891747B}"/>
+              </a:ext>
+            </a:extLst>
+          </p:cNvPr>
+          <p:cNvSpPr txBox="1"/>
+          <p:nvPr/>
+        </p:nvSpPr>
+        <p:spPr>
+          <a:xfrm>
+            <a:off x="33776271" y="2278587"/>
+            <a:ext cx="5250155" cy="1612749"/>
+          </a:xfrm>
+          <a:prstGeom prst="rect">
+            <a:avLst/>
+          </a:prstGeom>
+          <a:noFill/>
+        </p:spPr>
+        <p:txBody>
+          <a:bodyPr wrap="none" rtlCol="0">
+            <a:spAutoFit/>
+          </a:bodyPr>
+          <a:lstStyle/>
+          <a:p>
+            <a:pPr defTabSz="806500"/>
+            <a:r>
+              <a:rPr lang="zh-CN" altLang="en-US" sz="9880" b="1" dirty="0">
+                <a:solidFill>
+                  <a:srgbClr val="70AD47">
+                    <a:lumMod val="20000"/>
+                    <a:lumOff val="80000"/>
+                  </a:srgbClr>
+                </a:solidFill>
+                <a:latin typeface="Calibri" panose="020F0502020204030204"/>
+                <a:ea typeface="等线" panose="02010600030101010101" pitchFamily="2" charset="-122"/>
+              </a:rPr>
+              <a:t>任务跟进</a:t>
+            </a:r>
+          </a:p>
+        </p:txBody>
+      </p:sp>
+      <p:sp>
+        <p:nvSpPr>
+          <p:cNvPr id="22" name="矩形 21">
+            <a:extLst>
+              <a:ext uri="{FF2B5EF4-FFF2-40B4-BE49-F238E27FC236}">
+                <a16:creationId xmlns:a16="http://schemas.microsoft.com/office/drawing/2014/main" id="{D569B461-105E-B66B-4002-0DCC5DCA0293}"/>
               </a:ext>
             </a:extLst>
           </p:cNvPr>
@@ -3012,8 +3102,8 @@
         </p:nvSpPr>
         <p:spPr>
           <a:xfrm>
-            <a:off x="892110" y="990351"/>
-            <a:ext cx="4363555" cy="2164995"/>
+            <a:off x="3568478" y="16295794"/>
+            <a:ext cx="17454220" cy="8659980"/>
           </a:xfrm>
           <a:prstGeom prst="rect">
             <a:avLst/>
@@ -3055,8 +3145,8 @@
           <a:bodyPr rtlCol="0" anchor="ctr"/>
           <a:lstStyle/>
           <a:p>
-            <a:pPr algn="ctr" defTabSz="201625"/>
-            <a:endParaRPr lang="zh-CN" altLang="en-US" sz="215">
+            <a:pPr algn="ctr" defTabSz="806500"/>
+            <a:endParaRPr lang="zh-CN" altLang="en-US" sz="860">
               <a:solidFill>
                 <a:prstClr val="white"/>
               </a:solidFill>
@@ -3068,10 +3158,10 @@
       </p:sp>
       <p:sp>
         <p:nvSpPr>
-          <p:cNvPr id="17" name="文本框 16">
+          <p:cNvPr id="23" name="文本框 22">
             <a:extLst>
               <a:ext uri="{FF2B5EF4-FFF2-40B4-BE49-F238E27FC236}">
-                <a16:creationId xmlns:a16="http://schemas.microsoft.com/office/drawing/2014/main" id="{98D68A1E-7AAC-3AB5-6A84-F15E7E951D25}"/>
+                <a16:creationId xmlns:a16="http://schemas.microsoft.com/office/drawing/2014/main" id="{75719E9D-D10B-FDB0-D829-F4750151A5DE}"/>
               </a:ext>
             </a:extLst>
           </p:cNvPr>
@@ -3080,8 +3170,8 @@
         </p:nvSpPr>
         <p:spPr>
           <a:xfrm>
-            <a:off x="2399838" y="560077"/>
-            <a:ext cx="1454244" cy="472437"/>
+            <a:off x="9599355" y="14575183"/>
+            <a:ext cx="5250155" cy="1612749"/>
           </a:xfrm>
           <a:prstGeom prst="rect">
             <a:avLst/>
@@ -3094,9 +3184,9 @@
           </a:bodyPr>
           <a:lstStyle/>
           <a:p>
-            <a:pPr defTabSz="201625"/>
-            <a:r>
-              <a:rPr lang="zh-CN" altLang="en-US" sz="2470" b="1" dirty="0">
+            <a:pPr defTabSz="806500"/>
+            <a:r>
+              <a:rPr lang="zh-CN" altLang="en-US" sz="9880" b="1" dirty="0">
                 <a:solidFill>
                   <a:srgbClr val="70AD47">
                     <a:lumMod val="20000"/>
@@ -3106,233 +3196,7 @@
                 <a:latin typeface="Calibri" panose="020F0502020204030204"/>
                 <a:ea typeface="等线" panose="02010600030101010101" pitchFamily="2" charset="-122"/>
               </a:rPr>
-              <a:t>临时文件</a:t>
-            </a:r>
-          </a:p>
-        </p:txBody>
-      </p:sp>
-      <p:sp>
-        <p:nvSpPr>
-          <p:cNvPr id="20" name="矩形 19">
-            <a:extLst>
-              <a:ext uri="{FF2B5EF4-FFF2-40B4-BE49-F238E27FC236}">
-                <a16:creationId xmlns:a16="http://schemas.microsoft.com/office/drawing/2014/main" id="{BDA8220A-C1CD-EFBF-3E31-CD86540FDF08}"/>
-              </a:ext>
-            </a:extLst>
-          </p:cNvPr>
-          <p:cNvSpPr/>
-          <p:nvPr/>
-        </p:nvSpPr>
-        <p:spPr>
-          <a:xfrm>
-            <a:off x="6936337" y="990351"/>
-            <a:ext cx="4363555" cy="2164995"/>
-          </a:xfrm>
-          <a:prstGeom prst="rect">
-            <a:avLst/>
-          </a:prstGeom>
-          <a:solidFill>
-            <a:srgbClr val="76BE00">
-              <a:alpha val="69804"/>
-            </a:srgbClr>
-          </a:solidFill>
-          <a:ln>
-            <a:noFill/>
-          </a:ln>
-          <a:effectLst>
-            <a:outerShdw blurRad="76200" dir="18900000" sy="23000" kx="-1200000" algn="bl" rotWithShape="0">
-              <a:prstClr val="black">
-                <a:alpha val="20000"/>
-              </a:prstClr>
-            </a:outerShdw>
-            <a:softEdge rad="12700"/>
-          </a:effectLst>
-        </p:spPr>
-        <p:style>
-          <a:lnRef idx="2">
-            <a:schemeClr val="accent1">
-              <a:shade val="15000"/>
-            </a:schemeClr>
-          </a:lnRef>
-          <a:fillRef idx="1">
-            <a:schemeClr val="accent1"/>
-          </a:fillRef>
-          <a:effectRef idx="0">
-            <a:schemeClr val="accent1"/>
-          </a:effectRef>
-          <a:fontRef idx="minor">
-            <a:schemeClr val="lt1"/>
-          </a:fontRef>
-        </p:style>
-        <p:txBody>
-          <a:bodyPr rtlCol="0" anchor="ctr"/>
-          <a:lstStyle/>
-          <a:p>
-            <a:pPr algn="ctr" defTabSz="201625"/>
-            <a:endParaRPr lang="zh-CN" altLang="en-US" sz="215">
-              <a:solidFill>
-                <a:prstClr val="white"/>
-              </a:solidFill>
-              <a:latin typeface="Calibri" panose="020F0502020204030204"/>
-              <a:ea typeface="等线" panose="02010600030101010101" pitchFamily="2" charset="-122"/>
-            </a:endParaRPr>
-          </a:p>
-        </p:txBody>
-      </p:sp>
-      <p:sp>
-        <p:nvSpPr>
-          <p:cNvPr id="21" name="文本框 20">
-            <a:extLst>
-              <a:ext uri="{FF2B5EF4-FFF2-40B4-BE49-F238E27FC236}">
-                <a16:creationId xmlns:a16="http://schemas.microsoft.com/office/drawing/2014/main" id="{676EC5DB-12DE-1235-61F9-CBBA3891747B}"/>
-              </a:ext>
-            </a:extLst>
-          </p:cNvPr>
-          <p:cNvSpPr txBox="1"/>
-          <p:nvPr/>
-        </p:nvSpPr>
-        <p:spPr>
-          <a:xfrm>
-            <a:off x="8444066" y="569637"/>
-            <a:ext cx="1454244" cy="472437"/>
-          </a:xfrm>
-          <a:prstGeom prst="rect">
-            <a:avLst/>
-          </a:prstGeom>
-          <a:noFill/>
-        </p:spPr>
-        <p:txBody>
-          <a:bodyPr wrap="none" rtlCol="0">
-            <a:spAutoFit/>
-          </a:bodyPr>
-          <a:lstStyle/>
-          <a:p>
-            <a:pPr defTabSz="201625"/>
-            <a:r>
-              <a:rPr lang="zh-CN" altLang="en-US" sz="2470" b="1" dirty="0">
-                <a:solidFill>
-                  <a:srgbClr val="70AD47">
-                    <a:lumMod val="20000"/>
-                    <a:lumOff val="80000"/>
-                  </a:srgbClr>
-                </a:solidFill>
-                <a:latin typeface="Calibri" panose="020F0502020204030204"/>
-                <a:ea typeface="等线" panose="02010600030101010101" pitchFamily="2" charset="-122"/>
-              </a:rPr>
-              <a:t>任务跟进</a:t>
-            </a:r>
-          </a:p>
-        </p:txBody>
-      </p:sp>
-      <p:sp>
-        <p:nvSpPr>
-          <p:cNvPr id="22" name="矩形 21">
-            <a:extLst>
-              <a:ext uri="{FF2B5EF4-FFF2-40B4-BE49-F238E27FC236}">
-                <a16:creationId xmlns:a16="http://schemas.microsoft.com/office/drawing/2014/main" id="{D569B461-105E-B66B-4002-0DCC5DCA0293}"/>
-              </a:ext>
-            </a:extLst>
-          </p:cNvPr>
-          <p:cNvSpPr/>
-          <p:nvPr/>
-        </p:nvSpPr>
-        <p:spPr>
-          <a:xfrm>
-            <a:off x="892110" y="4027875"/>
-            <a:ext cx="4363555" cy="2164995"/>
-          </a:xfrm>
-          <a:prstGeom prst="rect">
-            <a:avLst/>
-          </a:prstGeom>
-          <a:solidFill>
-            <a:srgbClr val="76BE00">
-              <a:alpha val="69804"/>
-            </a:srgbClr>
-          </a:solidFill>
-          <a:ln>
-            <a:noFill/>
-          </a:ln>
-          <a:effectLst>
-            <a:outerShdw blurRad="76200" dir="18900000" sy="23000" kx="-1200000" algn="bl" rotWithShape="0">
-              <a:prstClr val="black">
-                <a:alpha val="20000"/>
-              </a:prstClr>
-            </a:outerShdw>
-            <a:softEdge rad="12700"/>
-          </a:effectLst>
-        </p:spPr>
-        <p:style>
-          <a:lnRef idx="2">
-            <a:schemeClr val="accent1">
-              <a:shade val="15000"/>
-            </a:schemeClr>
-          </a:lnRef>
-          <a:fillRef idx="1">
-            <a:schemeClr val="accent1"/>
-          </a:fillRef>
-          <a:effectRef idx="0">
-            <a:schemeClr val="accent1"/>
-          </a:effectRef>
-          <a:fontRef idx="minor">
-            <a:schemeClr val="lt1"/>
-          </a:fontRef>
-        </p:style>
-        <p:txBody>
-          <a:bodyPr rtlCol="0" anchor="ctr"/>
-          <a:lstStyle/>
-          <a:p>
-            <a:pPr algn="ctr" defTabSz="201625"/>
-            <a:endParaRPr lang="zh-CN" altLang="en-US" sz="215">
-              <a:solidFill>
-                <a:prstClr val="white"/>
-              </a:solidFill>
-              <a:latin typeface="Calibri" panose="020F0502020204030204"/>
-              <a:ea typeface="等线" panose="02010600030101010101" pitchFamily="2" charset="-122"/>
-            </a:endParaRPr>
-          </a:p>
-        </p:txBody>
-      </p:sp>
-      <p:sp>
-        <p:nvSpPr>
-          <p:cNvPr id="23" name="文本框 22">
-            <a:extLst>
-              <a:ext uri="{FF2B5EF4-FFF2-40B4-BE49-F238E27FC236}">
-                <a16:creationId xmlns:a16="http://schemas.microsoft.com/office/drawing/2014/main" id="{75719E9D-D10B-FDB0-D829-F4750151A5DE}"/>
-              </a:ext>
-            </a:extLst>
-          </p:cNvPr>
-          <p:cNvSpPr txBox="1"/>
-          <p:nvPr/>
-        </p:nvSpPr>
-        <p:spPr>
-          <a:xfrm>
-            <a:off x="2399838" y="3647913"/>
-            <a:ext cx="1454244" cy="472437"/>
-          </a:xfrm>
-          <a:prstGeom prst="rect">
-            <a:avLst/>
-          </a:prstGeom>
-          <a:noFill/>
-        </p:spPr>
-        <p:txBody>
-          <a:bodyPr wrap="none" rtlCol="0">
-            <a:spAutoFit/>
-          </a:bodyPr>
-          <a:lstStyle/>
-          <a:p>
-            <a:pPr defTabSz="201625"/>
-            <a:r>
-              <a:rPr lang="zh-CN" altLang="en-US" sz="2470" b="1" dirty="0">
-                <a:solidFill>
-                  <a:srgbClr val="70AD47">
-                    <a:lumMod val="20000"/>
-                    <a:lumOff val="80000"/>
-                  </a:srgbClr>
-                </a:solidFill>
-                <a:latin typeface="Calibri" panose="020F0502020204030204"/>
-                <a:ea typeface="等线" panose="02010600030101010101" pitchFamily="2" charset="-122"/>
-              </a:rPr>
-              <a:t>学习资料</a:t>
+              <a:t>相关资料</a:t>
             </a:r>
           </a:p>
         </p:txBody>
@@ -3351,8 +3215,8 @@
         </p:nvGrpSpPr>
         <p:grpSpPr>
           <a:xfrm>
-            <a:off x="6812971" y="3597722"/>
-            <a:ext cx="4486919" cy="2595147"/>
+            <a:off x="27251921" y="14575182"/>
+            <a:ext cx="17947675" cy="10380588"/>
             <a:chOff x="3862478" y="317410"/>
             <a:chExt cx="2543886" cy="1471334"/>
           </a:xfrm>
@@ -3414,8 +3278,8 @@
             <a:bodyPr rtlCol="0" anchor="ctr"/>
             <a:lstStyle/>
             <a:p>
-              <a:pPr algn="ctr" defTabSz="201625"/>
-              <a:endParaRPr lang="zh-CN" altLang="en-US" sz="215">
+              <a:pPr algn="ctr" defTabSz="806500"/>
+              <a:endParaRPr lang="zh-CN" altLang="en-US" sz="860">
                 <a:solidFill>
                   <a:prstClr val="white"/>
                 </a:solidFill>
@@ -3440,7 +3304,7 @@
           <p:spPr>
             <a:xfrm>
               <a:off x="5438102" y="317410"/>
-              <a:ext cx="824492" cy="267851"/>
+              <a:ext cx="744152" cy="228589"/>
             </a:xfrm>
             <a:prstGeom prst="rect">
               <a:avLst/>
@@ -3453,9 +3317,9 @@
             </a:bodyPr>
             <a:lstStyle/>
             <a:p>
-              <a:pPr defTabSz="201625"/>
+              <a:pPr defTabSz="806500"/>
               <a:r>
-                <a:rPr lang="zh-CN" altLang="en-US" sz="2470" b="1" dirty="0">
+                <a:rPr lang="zh-CN" altLang="en-US" sz="9880" b="1" dirty="0">
                   <a:solidFill>
                     <a:srgbClr val="70AD47">
                       <a:lumMod val="20000"/>
@@ -3527,8 +3391,8 @@
             <a:bodyPr rtlCol="0" anchor="ctr"/>
             <a:lstStyle/>
             <a:p>
-              <a:pPr algn="ctr" defTabSz="201625"/>
-              <a:endParaRPr lang="zh-CN" altLang="en-US" sz="215">
+              <a:pPr algn="ctr" defTabSz="806500"/>
+              <a:endParaRPr lang="zh-CN" altLang="en-US" sz="860">
                 <a:solidFill>
                   <a:prstClr val="white"/>
                 </a:solidFill>
@@ -3553,7 +3417,7 @@
           <p:spPr>
             <a:xfrm>
               <a:off x="4156197" y="322760"/>
-              <a:ext cx="644544" cy="267851"/>
+              <a:ext cx="564658" cy="228589"/>
             </a:xfrm>
             <a:prstGeom prst="rect">
               <a:avLst/>
@@ -3566,9 +3430,9 @@
             </a:bodyPr>
             <a:lstStyle/>
             <a:p>
-              <a:pPr defTabSz="201625"/>
+              <a:pPr defTabSz="806500"/>
               <a:r>
-                <a:rPr lang="zh-CN" altLang="en-US" sz="2470" b="1" dirty="0">
+                <a:rPr lang="zh-CN" altLang="en-US" sz="9880" b="1" dirty="0">
                   <a:solidFill>
                     <a:srgbClr val="70AD47">
                       <a:lumMod val="20000"/>
@@ -3579,6 +3443,707 @@
                   <a:ea typeface="等线" panose="02010600030101010101" pitchFamily="2" charset="-122"/>
                 </a:rPr>
                 <a:t>待处理</a:t>
+              </a:r>
+            </a:p>
+          </p:txBody>
+        </p:sp>
+      </p:grpSp>
+      <p:sp>
+        <p:nvSpPr>
+          <p:cNvPr id="9" name="矩形 8">
+            <a:extLst>
+              <a:ext uri="{FF2B5EF4-FFF2-40B4-BE49-F238E27FC236}">
+                <a16:creationId xmlns:a16="http://schemas.microsoft.com/office/drawing/2014/main" id="{70730628-E2FA-1379-8A19-150A9FBBA21E}"/>
+              </a:ext>
+            </a:extLst>
+          </p:cNvPr>
+          <p:cNvSpPr/>
+          <p:nvPr/>
+        </p:nvSpPr>
+        <p:spPr>
+          <a:xfrm>
+            <a:off x="3568478" y="3961446"/>
+            <a:ext cx="17454220" cy="8659980"/>
+          </a:xfrm>
+          <a:prstGeom prst="rect">
+            <a:avLst/>
+          </a:prstGeom>
+          <a:solidFill>
+            <a:srgbClr val="76BE00">
+              <a:alpha val="69804"/>
+            </a:srgbClr>
+          </a:solidFill>
+          <a:ln>
+            <a:noFill/>
+          </a:ln>
+          <a:effectLst>
+            <a:outerShdw blurRad="76200" dir="18900000" sy="23000" kx="-1200000" algn="bl" rotWithShape="0">
+              <a:prstClr val="black">
+                <a:alpha val="20000"/>
+              </a:prstClr>
+            </a:outerShdw>
+            <a:softEdge rad="12700"/>
+          </a:effectLst>
+        </p:spPr>
+        <p:style>
+          <a:lnRef idx="2">
+            <a:schemeClr val="accent1">
+              <a:shade val="15000"/>
+            </a:schemeClr>
+          </a:lnRef>
+          <a:fillRef idx="1">
+            <a:schemeClr val="accent1"/>
+          </a:fillRef>
+          <a:effectRef idx="0">
+            <a:schemeClr val="accent1"/>
+          </a:effectRef>
+          <a:fontRef idx="minor">
+            <a:schemeClr val="lt1"/>
+          </a:fontRef>
+        </p:style>
+        <p:txBody>
+          <a:bodyPr rtlCol="0" anchor="ctr"/>
+          <a:lstStyle/>
+          <a:p>
+            <a:pPr algn="ctr" defTabSz="806500"/>
+            <a:endParaRPr lang="zh-CN" altLang="en-US" sz="860">
+              <a:solidFill>
+                <a:prstClr val="white"/>
+              </a:solidFill>
+              <a:latin typeface="Calibri" panose="020F0502020204030204"/>
+              <a:ea typeface="等线" panose="02010600030101010101" pitchFamily="2" charset="-122"/>
+            </a:endParaRPr>
+          </a:p>
+        </p:txBody>
+      </p:sp>
+      <p:grpSp>
+        <p:nvGrpSpPr>
+          <p:cNvPr id="44" name="组合 43">
+            <a:extLst>
+              <a:ext uri="{FF2B5EF4-FFF2-40B4-BE49-F238E27FC236}">
+                <a16:creationId xmlns:a16="http://schemas.microsoft.com/office/drawing/2014/main" id="{10E84394-C079-F176-B696-BBF99EA7DE49}"/>
+              </a:ext>
+            </a:extLst>
+          </p:cNvPr>
+          <p:cNvGrpSpPr/>
+          <p:nvPr/>
+        </p:nvGrpSpPr>
+        <p:grpSpPr>
+          <a:xfrm>
+            <a:off x="27745386" y="3961446"/>
+            <a:ext cx="17454220" cy="8659980"/>
+            <a:chOff x="6936337" y="990351"/>
+            <a:chExt cx="4363555" cy="2164995"/>
+          </a:xfrm>
+        </p:grpSpPr>
+        <p:sp>
+          <p:nvSpPr>
+            <p:cNvPr id="20" name="矩形 19">
+              <a:extLst>
+                <a:ext uri="{FF2B5EF4-FFF2-40B4-BE49-F238E27FC236}">
+                  <a16:creationId xmlns:a16="http://schemas.microsoft.com/office/drawing/2014/main" id="{BDA8220A-C1CD-EFBF-3E31-CD86540FDF08}"/>
+                </a:ext>
+              </a:extLst>
+            </p:cNvPr>
+            <p:cNvSpPr/>
+            <p:nvPr/>
+          </p:nvSpPr>
+          <p:spPr>
+            <a:xfrm>
+              <a:off x="6936337" y="990351"/>
+              <a:ext cx="4363555" cy="2164995"/>
+            </a:xfrm>
+            <a:prstGeom prst="rect">
+              <a:avLst/>
+            </a:prstGeom>
+            <a:solidFill>
+              <a:srgbClr val="76BE00">
+                <a:alpha val="69804"/>
+              </a:srgbClr>
+            </a:solidFill>
+            <a:ln>
+              <a:noFill/>
+            </a:ln>
+            <a:effectLst>
+              <a:outerShdw blurRad="76200" dir="18900000" sy="23000" kx="-1200000" algn="bl" rotWithShape="0">
+                <a:prstClr val="black">
+                  <a:alpha val="20000"/>
+                </a:prstClr>
+              </a:outerShdw>
+              <a:softEdge rad="12700"/>
+            </a:effectLst>
+          </p:spPr>
+          <p:style>
+            <a:lnRef idx="2">
+              <a:schemeClr val="accent1">
+                <a:shade val="15000"/>
+              </a:schemeClr>
+            </a:lnRef>
+            <a:fillRef idx="1">
+              <a:schemeClr val="accent1"/>
+            </a:fillRef>
+            <a:effectRef idx="0">
+              <a:schemeClr val="accent1"/>
+            </a:effectRef>
+            <a:fontRef idx="minor">
+              <a:schemeClr val="lt1"/>
+            </a:fontRef>
+          </p:style>
+          <p:txBody>
+            <a:bodyPr rtlCol="0" anchor="ctr"/>
+            <a:lstStyle/>
+            <a:p>
+              <a:pPr algn="ctr" defTabSz="806500"/>
+              <a:endParaRPr lang="zh-CN" altLang="en-US" sz="860">
+                <a:solidFill>
+                  <a:prstClr val="white"/>
+                </a:solidFill>
+                <a:latin typeface="Calibri" panose="020F0502020204030204"/>
+                <a:ea typeface="等线" panose="02010600030101010101" pitchFamily="2" charset="-122"/>
+              </a:endParaRPr>
+            </a:p>
+          </p:txBody>
+        </p:sp>
+        <p:cxnSp>
+          <p:nvCxnSpPr>
+            <p:cNvPr id="10" name="直接连接符 9">
+              <a:extLst>
+                <a:ext uri="{FF2B5EF4-FFF2-40B4-BE49-F238E27FC236}">
+                  <a16:creationId xmlns:a16="http://schemas.microsoft.com/office/drawing/2014/main" id="{AE6D9F82-FCBC-A092-955B-610E294300BC}"/>
+                </a:ext>
+              </a:extLst>
+            </p:cNvPr>
+            <p:cNvCxnSpPr>
+              <a:cxnSpLocks/>
+            </p:cNvCxnSpPr>
+            <p:nvPr/>
+          </p:nvCxnSpPr>
+          <p:spPr>
+            <a:xfrm>
+              <a:off x="9845371" y="1007702"/>
+              <a:ext cx="0" cy="2122832"/>
+            </a:xfrm>
+            <a:prstGeom prst="line">
+              <a:avLst/>
+            </a:prstGeom>
+            <a:ln>
+              <a:solidFill>
+                <a:schemeClr val="accent6">
+                  <a:lumMod val="60000"/>
+                  <a:lumOff val="40000"/>
+                </a:schemeClr>
+              </a:solidFill>
+              <a:prstDash val="dash"/>
+            </a:ln>
+          </p:spPr>
+          <p:style>
+            <a:lnRef idx="2">
+              <a:schemeClr val="dk1"/>
+            </a:lnRef>
+            <a:fillRef idx="0">
+              <a:schemeClr val="dk1"/>
+            </a:fillRef>
+            <a:effectRef idx="1">
+              <a:schemeClr val="dk1"/>
+            </a:effectRef>
+            <a:fontRef idx="minor">
+              <a:schemeClr val="tx1"/>
+            </a:fontRef>
+          </p:style>
+        </p:cxnSp>
+        <p:cxnSp>
+          <p:nvCxnSpPr>
+            <p:cNvPr id="11" name="直接连接符 10">
+              <a:extLst>
+                <a:ext uri="{FF2B5EF4-FFF2-40B4-BE49-F238E27FC236}">
+                  <a16:creationId xmlns:a16="http://schemas.microsoft.com/office/drawing/2014/main" id="{877F4A3C-B4CF-54CB-788C-0641AF6C1A56}"/>
+                </a:ext>
+              </a:extLst>
+            </p:cNvPr>
+            <p:cNvCxnSpPr>
+              <a:cxnSpLocks/>
+            </p:cNvCxnSpPr>
+            <p:nvPr/>
+          </p:nvCxnSpPr>
+          <p:spPr>
+            <a:xfrm>
+              <a:off x="8390853" y="1007702"/>
+              <a:ext cx="0" cy="2122832"/>
+            </a:xfrm>
+            <a:prstGeom prst="line">
+              <a:avLst/>
+            </a:prstGeom>
+            <a:ln>
+              <a:solidFill>
+                <a:schemeClr val="accent6">
+                  <a:lumMod val="60000"/>
+                  <a:lumOff val="40000"/>
+                </a:schemeClr>
+              </a:solidFill>
+              <a:prstDash val="dash"/>
+            </a:ln>
+          </p:spPr>
+          <p:style>
+            <a:lnRef idx="2">
+              <a:schemeClr val="dk1"/>
+            </a:lnRef>
+            <a:fillRef idx="0">
+              <a:schemeClr val="dk1"/>
+            </a:fillRef>
+            <a:effectRef idx="1">
+              <a:schemeClr val="dk1"/>
+            </a:effectRef>
+            <a:fontRef idx="minor">
+              <a:schemeClr val="tx1"/>
+            </a:fontRef>
+          </p:style>
+        </p:cxnSp>
+      </p:grpSp>
+      <p:cxnSp>
+        <p:nvCxnSpPr>
+          <p:cNvPr id="15" name="直接连接符 14">
+            <a:extLst>
+              <a:ext uri="{FF2B5EF4-FFF2-40B4-BE49-F238E27FC236}">
+                <a16:creationId xmlns:a16="http://schemas.microsoft.com/office/drawing/2014/main" id="{C8A3EA1D-C97B-15B5-C17A-524A5874993B}"/>
+              </a:ext>
+            </a:extLst>
+          </p:cNvPr>
+          <p:cNvCxnSpPr>
+            <a:cxnSpLocks/>
+          </p:cNvCxnSpPr>
+          <p:nvPr/>
+        </p:nvCxnSpPr>
+        <p:spPr>
+          <a:xfrm>
+            <a:off x="15204580" y="16293600"/>
+            <a:ext cx="0" cy="8491328"/>
+          </a:xfrm>
+          <a:prstGeom prst="line">
+            <a:avLst/>
+          </a:prstGeom>
+          <a:ln>
+            <a:solidFill>
+              <a:schemeClr val="accent6">
+                <a:lumMod val="60000"/>
+                <a:lumOff val="40000"/>
+              </a:schemeClr>
+            </a:solidFill>
+            <a:prstDash val="dash"/>
+          </a:ln>
+        </p:spPr>
+        <p:style>
+          <a:lnRef idx="2">
+            <a:schemeClr val="dk1"/>
+          </a:lnRef>
+          <a:fillRef idx="0">
+            <a:schemeClr val="dk1"/>
+          </a:fillRef>
+          <a:effectRef idx="1">
+            <a:schemeClr val="dk1"/>
+          </a:effectRef>
+          <a:fontRef idx="minor">
+            <a:schemeClr val="tx1"/>
+          </a:fontRef>
+        </p:style>
+      </p:cxnSp>
+      <p:cxnSp>
+        <p:nvCxnSpPr>
+          <p:cNvPr id="16" name="直接连接符 15">
+            <a:extLst>
+              <a:ext uri="{FF2B5EF4-FFF2-40B4-BE49-F238E27FC236}">
+                <a16:creationId xmlns:a16="http://schemas.microsoft.com/office/drawing/2014/main" id="{C6CD99B3-5506-D50F-DAF1-6D8876E368DD}"/>
+              </a:ext>
+            </a:extLst>
+          </p:cNvPr>
+          <p:cNvCxnSpPr>
+            <a:cxnSpLocks/>
+          </p:cNvCxnSpPr>
+          <p:nvPr/>
+        </p:nvCxnSpPr>
+        <p:spPr>
+          <a:xfrm>
+            <a:off x="9386508" y="16293600"/>
+            <a:ext cx="0" cy="8491328"/>
+          </a:xfrm>
+          <a:prstGeom prst="line">
+            <a:avLst/>
+          </a:prstGeom>
+          <a:ln>
+            <a:solidFill>
+              <a:schemeClr val="accent6">
+                <a:lumMod val="60000"/>
+                <a:lumOff val="40000"/>
+              </a:schemeClr>
+            </a:solidFill>
+            <a:prstDash val="dash"/>
+          </a:ln>
+        </p:spPr>
+        <p:style>
+          <a:lnRef idx="2">
+            <a:schemeClr val="dk1"/>
+          </a:lnRef>
+          <a:fillRef idx="0">
+            <a:schemeClr val="dk1"/>
+          </a:fillRef>
+          <a:effectRef idx="1">
+            <a:schemeClr val="dk1"/>
+          </a:effectRef>
+          <a:fontRef idx="minor">
+            <a:schemeClr val="tx1"/>
+          </a:fontRef>
+        </p:style>
+      </p:cxnSp>
+      <p:grpSp>
+        <p:nvGrpSpPr>
+          <p:cNvPr id="39" name="组合 38">
+            <a:extLst>
+              <a:ext uri="{FF2B5EF4-FFF2-40B4-BE49-F238E27FC236}">
+                <a16:creationId xmlns:a16="http://schemas.microsoft.com/office/drawing/2014/main" id="{A633B760-A145-0C41-ED4D-E74202169F67}"/>
+              </a:ext>
+            </a:extLst>
+          </p:cNvPr>
+          <p:cNvGrpSpPr/>
+          <p:nvPr/>
+        </p:nvGrpSpPr>
+        <p:grpSpPr>
+          <a:xfrm>
+            <a:off x="29979748" y="11105480"/>
+            <a:ext cx="13900048" cy="1600440"/>
+            <a:chOff x="1408616" y="2776369"/>
+            <a:chExt cx="3475013" cy="400110"/>
+          </a:xfrm>
+        </p:grpSpPr>
+        <p:sp>
+          <p:nvSpPr>
+            <p:cNvPr id="40" name="矩形 39">
+              <a:extLst>
+                <a:ext uri="{FF2B5EF4-FFF2-40B4-BE49-F238E27FC236}">
+                  <a16:creationId xmlns:a16="http://schemas.microsoft.com/office/drawing/2014/main" id="{34ED815D-F94E-91F0-0B3D-5CB931ECB3F7}"/>
+                </a:ext>
+              </a:extLst>
+            </p:cNvPr>
+            <p:cNvSpPr/>
+            <p:nvPr/>
+          </p:nvSpPr>
+          <p:spPr>
+            <a:xfrm>
+              <a:off x="1408616" y="2776369"/>
+              <a:ext cx="421510" cy="400110"/>
+            </a:xfrm>
+            <a:prstGeom prst="rect">
+              <a:avLst/>
+            </a:prstGeom>
+            <a:noFill/>
+          </p:spPr>
+          <p:txBody>
+            <a:bodyPr wrap="none" lIns="365760" tIns="182880" rIns="365760" bIns="182880">
+              <a:spAutoFit/>
+            </a:bodyPr>
+            <a:lstStyle/>
+            <a:p>
+              <a:pPr algn="ctr"/>
+              <a:r>
+                <a:rPr lang="en-US" altLang="zh-CN" sz="8000" b="1" spc="200" dirty="0">
+                  <a:ln w="0"/>
+                  <a:solidFill>
+                    <a:schemeClr val="bg2"/>
+                  </a:solidFill>
+                  <a:effectLst>
+                    <a:innerShdw blurRad="63500" dist="50800" dir="13500000">
+                      <a:srgbClr val="000000">
+                        <a:alpha val="50000"/>
+                      </a:srgbClr>
+                    </a:innerShdw>
+                  </a:effectLst>
+                </a:rPr>
+                <a:t>AI</a:t>
+              </a:r>
+              <a:endParaRPr lang="zh-CN" altLang="en-US" sz="8000" b="1" spc="200" dirty="0">
+                <a:ln w="0"/>
+                <a:solidFill>
+                  <a:schemeClr val="bg2"/>
+                </a:solidFill>
+                <a:effectLst>
+                  <a:innerShdw blurRad="63500" dist="50800" dir="13500000">
+                    <a:srgbClr val="000000">
+                      <a:alpha val="50000"/>
+                    </a:srgbClr>
+                  </a:innerShdw>
+                </a:effectLst>
+              </a:endParaRPr>
+            </a:p>
+          </p:txBody>
+        </p:sp>
+        <p:sp>
+          <p:nvSpPr>
+            <p:cNvPr id="41" name="矩形 40">
+              <a:extLst>
+                <a:ext uri="{FF2B5EF4-FFF2-40B4-BE49-F238E27FC236}">
+                  <a16:creationId xmlns:a16="http://schemas.microsoft.com/office/drawing/2014/main" id="{054B3C0C-4249-AA84-30C4-0A4A5544A541}"/>
+                </a:ext>
+              </a:extLst>
+            </p:cNvPr>
+            <p:cNvSpPr/>
+            <p:nvPr/>
+          </p:nvSpPr>
+          <p:spPr>
+            <a:xfrm>
+              <a:off x="2718662" y="2776369"/>
+              <a:ext cx="710451" cy="400110"/>
+            </a:xfrm>
+            <a:prstGeom prst="rect">
+              <a:avLst/>
+            </a:prstGeom>
+            <a:noFill/>
+          </p:spPr>
+          <p:txBody>
+            <a:bodyPr wrap="none" lIns="365760" tIns="182880" rIns="365760" bIns="182880">
+              <a:spAutoFit/>
+            </a:bodyPr>
+            <a:lstStyle/>
+            <a:p>
+              <a:pPr algn="ctr"/>
+              <a:r>
+                <a:rPr lang="zh-CN" altLang="en-US" sz="8000" b="1" spc="200" dirty="0">
+                  <a:ln w="0"/>
+                  <a:solidFill>
+                    <a:schemeClr val="bg2"/>
+                  </a:solidFill>
+                  <a:effectLst>
+                    <a:innerShdw blurRad="63500" dist="50800" dir="13500000">
+                      <a:srgbClr val="000000">
+                        <a:alpha val="50000"/>
+                      </a:srgbClr>
+                    </a:innerShdw>
+                  </a:effectLst>
+                </a:rPr>
+                <a:t>肿瘤</a:t>
+              </a:r>
+            </a:p>
+          </p:txBody>
+        </p:sp>
+        <p:sp>
+          <p:nvSpPr>
+            <p:cNvPr id="42" name="矩形 41">
+              <a:extLst>
+                <a:ext uri="{FF2B5EF4-FFF2-40B4-BE49-F238E27FC236}">
+                  <a16:creationId xmlns:a16="http://schemas.microsoft.com/office/drawing/2014/main" id="{9F68B1B8-F747-D22F-4B60-1FBDA4F155D1}"/>
+                </a:ext>
+              </a:extLst>
+            </p:cNvPr>
+            <p:cNvSpPr/>
+            <p:nvPr/>
+          </p:nvSpPr>
+          <p:spPr>
+            <a:xfrm>
+              <a:off x="4173178" y="2776369"/>
+              <a:ext cx="710451" cy="400110"/>
+            </a:xfrm>
+            <a:prstGeom prst="rect">
+              <a:avLst/>
+            </a:prstGeom>
+            <a:noFill/>
+          </p:spPr>
+          <p:txBody>
+            <a:bodyPr wrap="none" lIns="365760" tIns="182880" rIns="365760" bIns="182880">
+              <a:spAutoFit/>
+            </a:bodyPr>
+            <a:lstStyle/>
+            <a:p>
+              <a:pPr algn="ctr"/>
+              <a:r>
+                <a:rPr lang="zh-CN" altLang="en-US" sz="8000" b="1" spc="200" dirty="0">
+                  <a:ln w="0"/>
+                  <a:solidFill>
+                    <a:schemeClr val="bg2"/>
+                  </a:solidFill>
+                  <a:effectLst>
+                    <a:innerShdw blurRad="63500" dist="50800" dir="13500000">
+                      <a:srgbClr val="000000">
+                        <a:alpha val="50000"/>
+                      </a:srgbClr>
+                    </a:innerShdw>
+                  </a:effectLst>
+                </a:rPr>
+                <a:t>生育</a:t>
+              </a:r>
+            </a:p>
+          </p:txBody>
+        </p:sp>
+      </p:grpSp>
+      <p:grpSp>
+        <p:nvGrpSpPr>
+          <p:cNvPr id="45" name="组合 44">
+            <a:extLst>
+              <a:ext uri="{FF2B5EF4-FFF2-40B4-BE49-F238E27FC236}">
+                <a16:creationId xmlns:a16="http://schemas.microsoft.com/office/drawing/2014/main" id="{D8BC81BD-B707-80D5-0494-F9A9447CE914}"/>
+              </a:ext>
+            </a:extLst>
+          </p:cNvPr>
+          <p:cNvGrpSpPr/>
+          <p:nvPr/>
+        </p:nvGrpSpPr>
+        <p:grpSpPr>
+          <a:xfrm>
+            <a:off x="5634496" y="23184488"/>
+            <a:ext cx="13900048" cy="1600440"/>
+            <a:chOff x="1408616" y="2776369"/>
+            <a:chExt cx="3475013" cy="400110"/>
+          </a:xfrm>
+        </p:grpSpPr>
+        <p:sp>
+          <p:nvSpPr>
+            <p:cNvPr id="46" name="矩形 45">
+              <a:extLst>
+                <a:ext uri="{FF2B5EF4-FFF2-40B4-BE49-F238E27FC236}">
+                  <a16:creationId xmlns:a16="http://schemas.microsoft.com/office/drawing/2014/main" id="{01B65DA4-C6E5-1B70-40F0-54460A67056C}"/>
+                </a:ext>
+              </a:extLst>
+            </p:cNvPr>
+            <p:cNvSpPr/>
+            <p:nvPr/>
+          </p:nvSpPr>
+          <p:spPr>
+            <a:xfrm>
+              <a:off x="1408616" y="2776369"/>
+              <a:ext cx="421510" cy="400110"/>
+            </a:xfrm>
+            <a:prstGeom prst="rect">
+              <a:avLst/>
+            </a:prstGeom>
+            <a:noFill/>
+          </p:spPr>
+          <p:txBody>
+            <a:bodyPr wrap="none" lIns="365760" tIns="182880" rIns="365760" bIns="182880">
+              <a:spAutoFit/>
+            </a:bodyPr>
+            <a:lstStyle/>
+            <a:p>
+              <a:pPr algn="ctr"/>
+              <a:r>
+                <a:rPr lang="en-US" altLang="zh-CN" sz="8000" b="1" spc="200" dirty="0">
+                  <a:ln w="0"/>
+                  <a:solidFill>
+                    <a:schemeClr val="bg2"/>
+                  </a:solidFill>
+                  <a:effectLst>
+                    <a:innerShdw blurRad="63500" dist="50800" dir="13500000">
+                      <a:srgbClr val="000000">
+                        <a:alpha val="50000"/>
+                      </a:srgbClr>
+                    </a:innerShdw>
+                  </a:effectLst>
+                </a:rPr>
+                <a:t>AI</a:t>
+              </a:r>
+              <a:endParaRPr lang="zh-CN" altLang="en-US" sz="8000" b="1" spc="200" dirty="0">
+                <a:ln w="0"/>
+                <a:solidFill>
+                  <a:schemeClr val="bg2"/>
+                </a:solidFill>
+                <a:effectLst>
+                  <a:innerShdw blurRad="63500" dist="50800" dir="13500000">
+                    <a:srgbClr val="000000">
+                      <a:alpha val="50000"/>
+                    </a:srgbClr>
+                  </a:innerShdw>
+                </a:effectLst>
+              </a:endParaRPr>
+            </a:p>
+          </p:txBody>
+        </p:sp>
+        <p:sp>
+          <p:nvSpPr>
+            <p:cNvPr id="47" name="矩形 46">
+              <a:extLst>
+                <a:ext uri="{FF2B5EF4-FFF2-40B4-BE49-F238E27FC236}">
+                  <a16:creationId xmlns:a16="http://schemas.microsoft.com/office/drawing/2014/main" id="{FEEB506A-8A53-CFA9-4674-9465232D72ED}"/>
+                </a:ext>
+              </a:extLst>
+            </p:cNvPr>
+            <p:cNvSpPr/>
+            <p:nvPr/>
+          </p:nvSpPr>
+          <p:spPr>
+            <a:xfrm>
+              <a:off x="2718662" y="2776369"/>
+              <a:ext cx="710451" cy="400110"/>
+            </a:xfrm>
+            <a:prstGeom prst="rect">
+              <a:avLst/>
+            </a:prstGeom>
+            <a:noFill/>
+          </p:spPr>
+          <p:txBody>
+            <a:bodyPr wrap="none" lIns="365760" tIns="182880" rIns="365760" bIns="182880">
+              <a:spAutoFit/>
+            </a:bodyPr>
+            <a:lstStyle/>
+            <a:p>
+              <a:pPr algn="ctr"/>
+              <a:r>
+                <a:rPr lang="zh-CN" altLang="en-US" sz="8000" b="1" spc="200" dirty="0">
+                  <a:ln w="0"/>
+                  <a:solidFill>
+                    <a:schemeClr val="bg2"/>
+                  </a:solidFill>
+                  <a:effectLst>
+                    <a:innerShdw blurRad="63500" dist="50800" dir="13500000">
+                      <a:srgbClr val="000000">
+                        <a:alpha val="50000"/>
+                      </a:srgbClr>
+                    </a:innerShdw>
+                  </a:effectLst>
+                </a:rPr>
+                <a:t>肿瘤</a:t>
+              </a:r>
+            </a:p>
+          </p:txBody>
+        </p:sp>
+        <p:sp>
+          <p:nvSpPr>
+            <p:cNvPr id="48" name="矩形 47">
+              <a:extLst>
+                <a:ext uri="{FF2B5EF4-FFF2-40B4-BE49-F238E27FC236}">
+                  <a16:creationId xmlns:a16="http://schemas.microsoft.com/office/drawing/2014/main" id="{A7224852-59F2-850F-0C53-A7FF7C8FAA8D}"/>
+                </a:ext>
+              </a:extLst>
+            </p:cNvPr>
+            <p:cNvSpPr/>
+            <p:nvPr/>
+          </p:nvSpPr>
+          <p:spPr>
+            <a:xfrm>
+              <a:off x="4173178" y="2776369"/>
+              <a:ext cx="710451" cy="400110"/>
+            </a:xfrm>
+            <a:prstGeom prst="rect">
+              <a:avLst/>
+            </a:prstGeom>
+            <a:noFill/>
+          </p:spPr>
+          <p:txBody>
+            <a:bodyPr wrap="none" lIns="365760" tIns="182880" rIns="365760" bIns="182880">
+              <a:spAutoFit/>
+            </a:bodyPr>
+            <a:lstStyle/>
+            <a:p>
+              <a:pPr algn="ctr"/>
+              <a:r>
+                <a:rPr lang="zh-CN" altLang="en-US" sz="8000" b="1" spc="200" dirty="0">
+                  <a:ln w="0"/>
+                  <a:solidFill>
+                    <a:schemeClr val="bg2"/>
+                  </a:solidFill>
+                  <a:effectLst>
+                    <a:innerShdw blurRad="63500" dist="50800" dir="13500000">
+                      <a:srgbClr val="000000">
+                        <a:alpha val="50000"/>
+                      </a:srgbClr>
+                    </a:innerShdw>
+                  </a:effectLst>
+                </a:rPr>
+                <a:t>生育</a:t>
               </a:r>
             </a:p>
           </p:txBody>
@@ -3598,7 +4163,7 @@
 </file>
 
 <file path=ppt/theme/theme1.xml><?xml version="1.0" encoding="utf-8"?>
-<a:theme xmlns:a="http://schemas.openxmlformats.org/drawingml/2006/main" name="1_Office 主题​​">
+<a:theme xmlns:a="http://schemas.openxmlformats.org/drawingml/2006/main" name="Office 主题​​">
   <a:themeElements>
     <a:clrScheme name="Office 主题​​">
       <a:dk1>

</xml_diff>